<commit_message>
Reorganize document to present tree vs graph planning first
</commit_message>
<xml_diff>
--- a/img/trees.pptx
+++ b/img/trees.pptx
@@ -110,6 +110,11 @@
       </a:defRPr>
     </a:lvl9pPr>
   </p:defaultTextStyle>
+  <p:extLst>
+    <p:ext uri="{EFAFB233-063F-42B5-8137-9DF3F51BA10A}">
+      <p15:sldGuideLst xmlns:p15="http://schemas.microsoft.com/office/powerpoint/2012/main"/>
+    </p:ext>
+  </p:extLst>
 </p:presentation>
 </file>
 
@@ -195,7 +200,7 @@
           <a:p>
             <a:fld id="{7032D634-87B9-4515-9E90-7412EACBC911}" type="datetimeFigureOut">
               <a:rPr lang="fr-FR" smtClean="0"/>
-              <a:t>28/02/2020</a:t>
+              <a:t>19/03/2020</a:t>
             </a:fld>
             <a:endParaRPr lang="fr-FR"/>
           </a:p>
@@ -593,7 +598,7 @@
           <a:p>
             <a:fld id="{CC506755-3F84-4679-BA59-3527CD676A9A}" type="datetimeFigureOut">
               <a:rPr lang="fr-FR" smtClean="0"/>
-              <a:t>28/02/2020</a:t>
+              <a:t>19/03/2020</a:t>
             </a:fld>
             <a:endParaRPr lang="fr-FR"/>
           </a:p>
@@ -763,7 +768,7 @@
           <a:p>
             <a:fld id="{CC506755-3F84-4679-BA59-3527CD676A9A}" type="datetimeFigureOut">
               <a:rPr lang="fr-FR" smtClean="0"/>
-              <a:t>28/02/2020</a:t>
+              <a:t>19/03/2020</a:t>
             </a:fld>
             <a:endParaRPr lang="fr-FR"/>
           </a:p>
@@ -943,7 +948,7 @@
           <a:p>
             <a:fld id="{CC506755-3F84-4679-BA59-3527CD676A9A}" type="datetimeFigureOut">
               <a:rPr lang="fr-FR" smtClean="0"/>
-              <a:t>28/02/2020</a:t>
+              <a:t>19/03/2020</a:t>
             </a:fld>
             <a:endParaRPr lang="fr-FR"/>
           </a:p>
@@ -1113,7 +1118,7 @@
           <a:p>
             <a:fld id="{CC506755-3F84-4679-BA59-3527CD676A9A}" type="datetimeFigureOut">
               <a:rPr lang="fr-FR" smtClean="0"/>
-              <a:t>28/02/2020</a:t>
+              <a:t>19/03/2020</a:t>
             </a:fld>
             <a:endParaRPr lang="fr-FR"/>
           </a:p>
@@ -1357,7 +1362,7 @@
           <a:p>
             <a:fld id="{CC506755-3F84-4679-BA59-3527CD676A9A}" type="datetimeFigureOut">
               <a:rPr lang="fr-FR" smtClean="0"/>
-              <a:t>28/02/2020</a:t>
+              <a:t>19/03/2020</a:t>
             </a:fld>
             <a:endParaRPr lang="fr-FR"/>
           </a:p>
@@ -1589,7 +1594,7 @@
           <a:p>
             <a:fld id="{CC506755-3F84-4679-BA59-3527CD676A9A}" type="datetimeFigureOut">
               <a:rPr lang="fr-FR" smtClean="0"/>
-              <a:t>28/02/2020</a:t>
+              <a:t>19/03/2020</a:t>
             </a:fld>
             <a:endParaRPr lang="fr-FR"/>
           </a:p>
@@ -1956,7 +1961,7 @@
           <a:p>
             <a:fld id="{CC506755-3F84-4679-BA59-3527CD676A9A}" type="datetimeFigureOut">
               <a:rPr lang="fr-FR" smtClean="0"/>
-              <a:t>28/02/2020</a:t>
+              <a:t>19/03/2020</a:t>
             </a:fld>
             <a:endParaRPr lang="fr-FR"/>
           </a:p>
@@ -2074,7 +2079,7 @@
           <a:p>
             <a:fld id="{CC506755-3F84-4679-BA59-3527CD676A9A}" type="datetimeFigureOut">
               <a:rPr lang="fr-FR" smtClean="0"/>
-              <a:t>28/02/2020</a:t>
+              <a:t>19/03/2020</a:t>
             </a:fld>
             <a:endParaRPr lang="fr-FR"/>
           </a:p>
@@ -2169,7 +2174,7 @@
           <a:p>
             <a:fld id="{CC506755-3F84-4679-BA59-3527CD676A9A}" type="datetimeFigureOut">
               <a:rPr lang="fr-FR" smtClean="0"/>
-              <a:t>28/02/2020</a:t>
+              <a:t>19/03/2020</a:t>
             </a:fld>
             <a:endParaRPr lang="fr-FR"/>
           </a:p>
@@ -2446,7 +2451,7 @@
           <a:p>
             <a:fld id="{CC506755-3F84-4679-BA59-3527CD676A9A}" type="datetimeFigureOut">
               <a:rPr lang="fr-FR" smtClean="0"/>
-              <a:t>28/02/2020</a:t>
+              <a:t>19/03/2020</a:t>
             </a:fld>
             <a:endParaRPr lang="fr-FR"/>
           </a:p>
@@ -2703,7 +2708,7 @@
           <a:p>
             <a:fld id="{CC506755-3F84-4679-BA59-3527CD676A9A}" type="datetimeFigureOut">
               <a:rPr lang="fr-FR" smtClean="0"/>
-              <a:t>28/02/2020</a:t>
+              <a:t>19/03/2020</a:t>
             </a:fld>
             <a:endParaRPr lang="fr-FR"/>
           </a:p>
@@ -2916,7 +2921,7 @@
           <a:p>
             <a:fld id="{CC506755-3F84-4679-BA59-3527CD676A9A}" type="datetimeFigureOut">
               <a:rPr lang="fr-FR" smtClean="0"/>
-              <a:t>28/02/2020</a:t>
+              <a:t>19/03/2020</a:t>
             </a:fld>
             <a:endParaRPr lang="fr-FR"/>
           </a:p>
@@ -4505,8 +4510,8 @@
             <a:solidFill>
               <a:schemeClr val="tx1"/>
             </a:solidFill>
-            <a:headEnd type="oval"/>
-            <a:tailEnd type="oval"/>
+            <a:headEnd type="oval" w="lg" len="lg"/>
+            <a:tailEnd type="oval" w="lg" len="lg"/>
           </a:ln>
         </p:spPr>
         <p:style>
@@ -4550,8 +4555,8 @@
             <a:solidFill>
               <a:schemeClr val="tx1"/>
             </a:solidFill>
-            <a:headEnd type="oval"/>
-            <a:tailEnd type="oval"/>
+            <a:headEnd type="oval" w="lg" len="lg"/>
+            <a:tailEnd type="oval" w="lg" len="lg"/>
           </a:ln>
         </p:spPr>
         <p:style>
@@ -4595,8 +4600,8 @@
             <a:solidFill>
               <a:schemeClr val="tx1"/>
             </a:solidFill>
-            <a:headEnd type="oval"/>
-            <a:tailEnd type="oval"/>
+            <a:headEnd type="oval" w="lg" len="lg"/>
+            <a:tailEnd type="oval" w="lg" len="lg"/>
           </a:ln>
         </p:spPr>
         <p:style>
@@ -4640,8 +4645,8 @@
             <a:solidFill>
               <a:schemeClr val="tx1"/>
             </a:solidFill>
-            <a:headEnd type="oval"/>
-            <a:tailEnd type="oval"/>
+            <a:headEnd type="oval" w="lg" len="lg"/>
+            <a:tailEnd type="oval" w="lg" len="lg"/>
           </a:ln>
         </p:spPr>
         <p:style>
@@ -4820,8 +4825,8 @@
             <a:solidFill>
               <a:schemeClr val="tx1"/>
             </a:solidFill>
-            <a:headEnd type="oval"/>
-            <a:tailEnd type="oval"/>
+            <a:headEnd type="oval" w="lg" len="lg"/>
+            <a:tailEnd type="oval" w="lg" len="lg"/>
           </a:ln>
         </p:spPr>
         <p:style>
@@ -4865,7 +4870,7 @@
             <a:solidFill>
               <a:srgbClr val="C00000"/>
             </a:solidFill>
-            <a:headEnd type="oval"/>
+            <a:headEnd type="oval" w="lg" len="lg"/>
             <a:tailEnd type="oval"/>
           </a:ln>
         </p:spPr>
@@ -4901,7 +4906,7 @@
         <p:spPr>
           <a:xfrm>
             <a:off x="3897173" y="3896556"/>
-            <a:ext cx="0" cy="33851"/>
+            <a:ext cx="0" cy="0"/>
           </a:xfrm>
           <a:prstGeom prst="line">
             <a:avLst/>
@@ -4910,7 +4915,7 @@
             <a:solidFill>
               <a:srgbClr val="C00000"/>
             </a:solidFill>
-            <a:headEnd type="oval"/>
+            <a:headEnd type="oval" w="lg" len="lg"/>
             <a:tailEnd type="oval"/>
           </a:ln>
         </p:spPr>
@@ -4946,7 +4951,7 @@
             <p:spPr>
               <a:xfrm>
                 <a:off x="2803261" y="1510973"/>
-                <a:ext cx="413510" cy="430887"/>
+                <a:ext cx="435119" cy="444417"/>
               </a:xfrm>
               <a:prstGeom prst="rect">
                 <a:avLst/>
@@ -4962,6 +4967,7 @@
               </a:bodyPr>
               <a:lstStyle/>
               <a:p>
+                <a:pPr/>
                 <a14:m>
                   <m:oMathPara xmlns:m="http://schemas.openxmlformats.org/officeDocument/2006/math">
                     <m:oMathParaPr>
@@ -4971,23 +4977,34 @@
                       <m:sSub>
                         <m:sSubPr>
                           <m:ctrlPr>
-                            <a:rPr lang="fr-FR" sz="2800" i="1">
+                            <a:rPr lang="fr-FR" sz="2800" b="0" i="1" smtClean="0">
                               <a:latin typeface="Cambria Math" panose="02040503050406030204" pitchFamily="18" charset="0"/>
                             </a:rPr>
                           </m:ctrlPr>
                         </m:sSubPr>
                         <m:e>
-                          <m:r>
-                            <a:rPr lang="fr-FR" sz="2800" i="1">
-                              <a:latin typeface="Cambria Math" panose="02040503050406030204" pitchFamily="18" charset="0"/>
-                              <a:ea typeface="Cambria Math" panose="02040503050406030204" pitchFamily="18" charset="0"/>
-                            </a:rPr>
-                            <m:t>ℐ</m:t>
-                          </m:r>
+                          <m:acc>
+                            <m:accPr>
+                              <m:chr m:val="̇"/>
+                              <m:ctrlPr>
+                                <a:rPr lang="fr-FR" sz="2800" b="0" i="1" smtClean="0">
+                                  <a:latin typeface="Cambria Math" panose="02040503050406030204" pitchFamily="18" charset="0"/>
+                                </a:rPr>
+                              </m:ctrlPr>
+                            </m:accPr>
+                            <m:e>
+                              <m:r>
+                                <a:rPr lang="fr-FR" sz="2800" b="0" i="1" smtClean="0">
+                                  <a:latin typeface="Cambria Math" panose="02040503050406030204" pitchFamily="18" charset="0"/>
+                                </a:rPr>
+                                <m:t>𝑇</m:t>
+                              </m:r>
+                            </m:e>
+                          </m:acc>
                         </m:e>
                         <m:sub>
                           <m:r>
-                            <a:rPr lang="fr-FR" sz="2800" i="1">
+                            <a:rPr lang="fr-FR" sz="2800" b="0" i="1" smtClean="0">
                               <a:latin typeface="Cambria Math" panose="02040503050406030204" pitchFamily="18" charset="0"/>
                             </a:rPr>
                             <m:t>𝑛</m:t>
@@ -5020,7 +5037,7 @@
             <p:spPr>
               <a:xfrm>
                 <a:off x="2803261" y="1510973"/>
-                <a:ext cx="413510" cy="430887"/>
+                <a:ext cx="435119" cy="444417"/>
               </a:xfrm>
               <a:prstGeom prst="rect">
                 <a:avLst/>
@@ -5067,7 +5084,7 @@
             <p:spPr>
               <a:xfrm>
                 <a:off x="1927728" y="2941478"/>
-                <a:ext cx="491032" cy="430887"/>
+                <a:ext cx="435119" cy="430887"/>
               </a:xfrm>
               <a:prstGeom prst="rect">
                 <a:avLst/>
@@ -5083,6 +5100,7 @@
               </a:bodyPr>
               <a:lstStyle/>
               <a:p>
+                <a:pPr/>
                 <a14:m>
                   <m:oMathPara xmlns:m="http://schemas.openxmlformats.org/officeDocument/2006/math">
                     <m:oMathParaPr>
@@ -5092,23 +5110,34 @@
                       <m:sSub>
                         <m:sSubPr>
                           <m:ctrlPr>
-                            <a:rPr lang="fr-FR" sz="2800" i="1">
+                            <a:rPr lang="fr-FR" sz="2800" b="0" i="1" smtClean="0">
                               <a:latin typeface="Cambria Math" panose="02040503050406030204" pitchFamily="18" charset="0"/>
                             </a:rPr>
                           </m:ctrlPr>
                         </m:sSubPr>
                         <m:e>
-                          <m:r>
-                            <a:rPr lang="fr-FR" sz="2800" i="1">
-                              <a:latin typeface="Cambria Math" panose="02040503050406030204" pitchFamily="18" charset="0"/>
-                              <a:ea typeface="Cambria Math" panose="02040503050406030204" pitchFamily="18" charset="0"/>
-                            </a:rPr>
-                            <m:t>ℒ</m:t>
-                          </m:r>
+                          <m:acc>
+                            <m:accPr>
+                              <m:chr m:val="̅"/>
+                              <m:ctrlPr>
+                                <a:rPr lang="fr-FR" sz="2800" i="1" smtClean="0">
+                                  <a:latin typeface="Cambria Math" panose="02040503050406030204" pitchFamily="18" charset="0"/>
+                                </a:rPr>
+                              </m:ctrlPr>
+                            </m:accPr>
+                            <m:e>
+                              <m:r>
+                                <a:rPr lang="fr-FR" sz="2800" b="0" i="1" smtClean="0">
+                                  <a:latin typeface="Cambria Math" panose="02040503050406030204" pitchFamily="18" charset="0"/>
+                                </a:rPr>
+                                <m:t>𝑇</m:t>
+                              </m:r>
+                            </m:e>
+                          </m:acc>
                         </m:e>
                         <m:sub>
                           <m:r>
-                            <a:rPr lang="fr-FR" sz="2800" i="1">
+                            <a:rPr lang="fr-FR" sz="2800" b="0" i="1" smtClean="0">
                               <a:latin typeface="Cambria Math" panose="02040503050406030204" pitchFamily="18" charset="0"/>
                             </a:rPr>
                             <m:t>𝑛</m:t>
@@ -5141,7 +5170,7 @@
             <p:spPr>
               <a:xfrm>
                 <a:off x="1927728" y="2941478"/>
-                <a:ext cx="491032" cy="430887"/>
+                <a:ext cx="435119" cy="430887"/>
               </a:xfrm>
               <a:prstGeom prst="rect">
                 <a:avLst/>
@@ -5197,7 +5226,7 @@
             <a:solidFill>
               <a:srgbClr val="0070C0"/>
             </a:solidFill>
-            <a:headEnd type="oval"/>
+            <a:headEnd type="oval" w="lg" len="lg"/>
             <a:tailEnd type="oval"/>
           </a:ln>
         </p:spPr>
@@ -5242,7 +5271,7 @@
             <a:solidFill>
               <a:srgbClr val="0070C0"/>
             </a:solidFill>
-            <a:headEnd type="oval"/>
+            <a:headEnd type="oval" w="lg" len="lg"/>
             <a:tailEnd type="oval"/>
           </a:ln>
         </p:spPr>
@@ -5319,8 +5348,8 @@
                 <a:lumMod val="65000"/>
               </a:schemeClr>
             </a:solidFill>
-            <a:headEnd type="oval"/>
-            <a:tailEnd type="oval"/>
+            <a:headEnd type="oval" w="lg" len="lg"/>
+            <a:tailEnd type="oval" w="lg" len="lg"/>
           </a:ln>
         </p:spPr>
         <p:style>
@@ -5366,8 +5395,8 @@
                 <a:lumMod val="65000"/>
               </a:schemeClr>
             </a:solidFill>
-            <a:headEnd type="oval"/>
-            <a:tailEnd type="oval"/>
+            <a:headEnd type="oval" w="lg" len="lg"/>
+            <a:tailEnd type="oval" w="lg" len="lg"/>
           </a:ln>
         </p:spPr>
         <p:style>
@@ -5413,8 +5442,8 @@
                 <a:lumMod val="65000"/>
               </a:schemeClr>
             </a:solidFill>
-            <a:headEnd type="oval"/>
-            <a:tailEnd type="oval"/>
+            <a:headEnd type="oval" w="lg" len="lg"/>
+            <a:tailEnd type="oval" w="lg" len="lg"/>
           </a:ln>
         </p:spPr>
         <p:style>
@@ -5460,8 +5489,8 @@
                 <a:lumMod val="65000"/>
               </a:schemeClr>
             </a:solidFill>
-            <a:headEnd type="oval"/>
-            <a:tailEnd type="oval"/>
+            <a:headEnd type="oval" w="lg" len="lg"/>
+            <a:tailEnd type="oval" w="lg" len="lg"/>
           </a:ln>
         </p:spPr>
         <p:style>
@@ -5507,8 +5536,8 @@
                 <a:lumMod val="65000"/>
               </a:schemeClr>
             </a:solidFill>
-            <a:headEnd type="oval"/>
-            <a:tailEnd type="oval"/>
+            <a:headEnd type="oval" w="lg" len="lg"/>
+            <a:tailEnd type="oval" w="lg" len="lg"/>
           </a:ln>
         </p:spPr>
         <p:style>
@@ -5554,8 +5583,8 @@
                 <a:lumMod val="65000"/>
               </a:schemeClr>
             </a:solidFill>
-            <a:headEnd type="oval"/>
-            <a:tailEnd type="oval"/>
+            <a:headEnd type="oval" w="lg" len="lg"/>
+            <a:tailEnd type="oval" w="lg" len="lg"/>
           </a:ln>
         </p:spPr>
         <p:style>
@@ -5601,8 +5630,8 @@
                 <a:lumMod val="65000"/>
               </a:schemeClr>
             </a:solidFill>
-            <a:headEnd type="oval"/>
-            <a:tailEnd type="oval"/>
+            <a:headEnd type="oval" w="lg" len="lg"/>
+            <a:tailEnd type="oval" w="lg" len="lg"/>
           </a:ln>
         </p:spPr>
         <p:style>
@@ -5648,8 +5677,8 @@
                 <a:lumMod val="65000"/>
               </a:schemeClr>
             </a:solidFill>
-            <a:headEnd type="oval"/>
-            <a:tailEnd type="oval"/>
+            <a:headEnd type="oval" w="lg" len="lg"/>
+            <a:tailEnd type="oval" w="lg" len="lg"/>
           </a:ln>
         </p:spPr>
         <p:style>
@@ -5693,8 +5722,8 @@
             <a:solidFill>
               <a:srgbClr val="C00000"/>
             </a:solidFill>
-            <a:headEnd type="oval"/>
-            <a:tailEnd type="oval"/>
+            <a:headEnd type="oval" w="lg" len="lg"/>
+            <a:tailEnd type="oval" w="lg" len="lg"/>
           </a:ln>
         </p:spPr>
         <p:style>
@@ -5729,7 +5758,7 @@
         <p:spPr>
           <a:xfrm>
             <a:off x="3798670" y="4017978"/>
-            <a:ext cx="0" cy="33851"/>
+            <a:ext cx="1" cy="0"/>
           </a:xfrm>
           <a:prstGeom prst="line">
             <a:avLst/>
@@ -5738,8 +5767,8 @@
             <a:solidFill>
               <a:srgbClr val="C00000"/>
             </a:solidFill>
-            <a:headEnd type="oval"/>
-            <a:tailEnd type="oval"/>
+            <a:headEnd type="oval" w="lg" len="lg"/>
+            <a:tailEnd type="oval" w="lg" len="lg"/>
           </a:ln>
         </p:spPr>
         <p:style>
@@ -5773,7 +5802,7 @@
         </p:nvCxnSpPr>
         <p:spPr>
           <a:xfrm flipV="1">
-            <a:off x="3009361" y="2607216"/>
+            <a:off x="2951491" y="2589855"/>
             <a:ext cx="345754" cy="1383043"/>
           </a:xfrm>
           <a:prstGeom prst="line">
@@ -5818,7 +5847,7 @@
         </p:nvCxnSpPr>
         <p:spPr>
           <a:xfrm flipH="1" flipV="1">
-            <a:off x="3550922" y="2616452"/>
+            <a:off x="3620368" y="2599089"/>
             <a:ext cx="345754" cy="1383043"/>
           </a:xfrm>
           <a:prstGeom prst="line">
@@ -5863,8 +5892,8 @@
         </p:nvCxnSpPr>
         <p:spPr>
           <a:xfrm flipV="1">
-            <a:off x="3352932" y="1479761"/>
-            <a:ext cx="617551" cy="1127461"/>
+            <a:off x="3314606" y="1468188"/>
+            <a:ext cx="609581" cy="1037731"/>
           </a:xfrm>
           <a:prstGeom prst="line">
             <a:avLst/>
@@ -5908,7 +5937,7 @@
         </p:nvCxnSpPr>
         <p:spPr>
           <a:xfrm flipV="1">
-            <a:off x="808081" y="1479759"/>
+            <a:off x="750211" y="1468185"/>
             <a:ext cx="617551" cy="1127461"/>
           </a:xfrm>
           <a:prstGeom prst="line">
@@ -5953,7 +5982,7 @@
         </p:nvCxnSpPr>
         <p:spPr>
           <a:xfrm flipH="1" flipV="1">
-            <a:off x="4163896" y="1479758"/>
+            <a:off x="4221767" y="1456610"/>
             <a:ext cx="617551" cy="1127461"/>
           </a:xfrm>
           <a:prstGeom prst="line">
@@ -5998,7 +6027,7 @@
         </p:nvCxnSpPr>
         <p:spPr>
           <a:xfrm flipH="1" flipV="1">
-            <a:off x="1627741" y="1479757"/>
+            <a:off x="1668252" y="1479757"/>
             <a:ext cx="617551" cy="1127461"/>
           </a:xfrm>
           <a:prstGeom prst="line">
@@ -6043,8 +6072,8 @@
         </p:nvCxnSpPr>
         <p:spPr>
           <a:xfrm flipV="1">
-            <a:off x="1469614" y="697665"/>
-            <a:ext cx="1274618" cy="735900"/>
+            <a:off x="1551009" y="645582"/>
+            <a:ext cx="1158500" cy="656573"/>
           </a:xfrm>
           <a:prstGeom prst="line">
             <a:avLst/>
@@ -6088,7 +6117,7 @@
         </p:nvCxnSpPr>
         <p:spPr>
           <a:xfrm flipH="1" flipV="1">
-            <a:off x="2859369" y="697665"/>
+            <a:off x="2876731" y="645580"/>
             <a:ext cx="1274618" cy="735900"/>
           </a:xfrm>
           <a:prstGeom prst="line">
@@ -6150,6 +6179,7 @@
               </a:bodyPr>
               <a:lstStyle/>
               <a:p>
+                <a:pPr/>
                 <a14:m>
                   <m:oMathPara xmlns:m="http://schemas.openxmlformats.org/officeDocument/2006/math">
                     <m:oMathParaPr>
@@ -6157,10 +6187,10 @@
                     </m:oMathParaPr>
                     <m:oMath xmlns:m="http://schemas.openxmlformats.org/officeDocument/2006/math">
                       <m:r>
-                        <a:rPr lang="fr-FR" sz="2800" i="1">
+                        <a:rPr lang="fr-FR" sz="2800" b="0" i="1" smtClean="0">
                           <a:latin typeface="Cambria Math" panose="02040503050406030204" pitchFamily="18" charset="0"/>
                         </a:rPr>
-                        <m:t>ℬ</m:t>
+                        <m:t>𝐵</m:t>
                       </m:r>
                     </m:oMath>
                   </m:oMathPara>
@@ -6244,8 +6274,8 @@
             <a:solidFill>
               <a:srgbClr val="0070C0"/>
             </a:solidFill>
-            <a:headEnd type="oval"/>
-            <a:tailEnd type="oval"/>
+            <a:headEnd type="oval" w="lg" len="lg"/>
+            <a:tailEnd type="oval" w="lg" len="lg"/>
           </a:ln>
         </p:spPr>
         <p:style>
@@ -6289,8 +6319,8 @@
             <a:solidFill>
               <a:srgbClr val="0070C0"/>
             </a:solidFill>
-            <a:headEnd type="oval"/>
-            <a:tailEnd type="oval"/>
+            <a:headEnd type="oval" w="lg" len="lg"/>
+            <a:tailEnd type="oval" w="lg" len="lg"/>
           </a:ln>
         </p:spPr>
         <p:style>
@@ -6366,8 +6396,8 @@
                 <a:lumMod val="75000"/>
               </a:schemeClr>
             </a:solidFill>
-            <a:headEnd type="oval"/>
-            <a:tailEnd type="oval"/>
+            <a:headEnd type="oval" w="lg" len="lg"/>
+            <a:tailEnd type="oval" w="lg" len="lg"/>
           </a:ln>
         </p:spPr>
         <p:style>
@@ -6413,8 +6443,8 @@
                 <a:lumMod val="75000"/>
               </a:schemeClr>
             </a:solidFill>
-            <a:headEnd type="oval"/>
-            <a:tailEnd type="oval"/>
+            <a:headEnd type="oval" w="lg" len="lg"/>
+            <a:tailEnd type="oval" w="lg" len="lg"/>
           </a:ln>
         </p:spPr>
         <p:style>
@@ -6460,8 +6490,8 @@
                 <a:lumMod val="75000"/>
               </a:schemeClr>
             </a:solidFill>
-            <a:headEnd type="oval"/>
-            <a:tailEnd type="oval"/>
+            <a:headEnd type="oval" w="lg" len="lg"/>
+            <a:tailEnd type="oval" w="lg" len="lg"/>
           </a:ln>
         </p:spPr>
         <p:style>
@@ -6507,8 +6537,8 @@
                 <a:lumMod val="75000"/>
               </a:schemeClr>
             </a:solidFill>
-            <a:headEnd type="oval"/>
-            <a:tailEnd type="oval"/>
+            <a:headEnd type="oval" w="lg" len="lg"/>
+            <a:tailEnd type="oval" w="lg" len="lg"/>
           </a:ln>
         </p:spPr>
         <p:style>
@@ -6554,8 +6584,8 @@
                 <a:lumMod val="75000"/>
               </a:schemeClr>
             </a:solidFill>
-            <a:headEnd type="oval"/>
-            <a:tailEnd type="oval"/>
+            <a:headEnd type="oval" w="lg" len="lg"/>
+            <a:tailEnd type="oval" w="lg" len="lg"/>
           </a:ln>
         </p:spPr>
         <p:style>
@@ -6601,8 +6631,8 @@
                 <a:lumMod val="75000"/>
               </a:schemeClr>
             </a:solidFill>
-            <a:headEnd type="oval"/>
-            <a:tailEnd type="oval"/>
+            <a:headEnd type="oval" w="lg" len="lg"/>
+            <a:tailEnd type="oval" w="lg" len="lg"/>
           </a:ln>
         </p:spPr>
         <p:style>
@@ -6648,8 +6678,8 @@
                 <a:lumMod val="75000"/>
               </a:schemeClr>
             </a:solidFill>
-            <a:headEnd type="oval"/>
-            <a:tailEnd type="oval"/>
+            <a:headEnd type="oval" w="lg" len="lg"/>
+            <a:tailEnd type="oval" w="lg" len="lg"/>
           </a:ln>
         </p:spPr>
         <p:style>
@@ -6695,8 +6725,8 @@
                 <a:lumMod val="75000"/>
               </a:schemeClr>
             </a:solidFill>
-            <a:headEnd type="oval"/>
-            <a:tailEnd type="oval"/>
+            <a:headEnd type="oval" w="lg" len="lg"/>
+            <a:tailEnd type="oval" w="lg" len="lg"/>
           </a:ln>
         </p:spPr>
         <p:style>
@@ -6740,8 +6770,8 @@
             <a:solidFill>
               <a:srgbClr val="C00000"/>
             </a:solidFill>
-            <a:headEnd type="oval"/>
-            <a:tailEnd type="oval"/>
+            <a:headEnd type="oval" w="lg" len="lg"/>
+            <a:tailEnd type="oval" w="lg" len="lg"/>
           </a:ln>
         </p:spPr>
         <p:style>
@@ -6776,7 +6806,7 @@
         <p:spPr>
           <a:xfrm>
             <a:off x="3869310" y="3932046"/>
-            <a:ext cx="0" cy="33851"/>
+            <a:ext cx="1" cy="0"/>
           </a:xfrm>
           <a:prstGeom prst="line">
             <a:avLst/>
@@ -6785,8 +6815,8 @@
             <a:solidFill>
               <a:srgbClr val="C00000"/>
             </a:solidFill>
-            <a:headEnd type="oval"/>
-            <a:tailEnd type="oval"/>
+            <a:headEnd type="oval" w="lg" len="lg"/>
+            <a:tailEnd type="oval" w="lg" len="lg"/>
           </a:ln>
         </p:spPr>
         <p:style>
@@ -6821,7 +6851,7 @@
             <p:spPr>
               <a:xfrm>
                 <a:off x="2775390" y="1546464"/>
-                <a:ext cx="416396" cy="430887"/>
+                <a:ext cx="396711" cy="430887"/>
               </a:xfrm>
               <a:prstGeom prst="rect">
                 <a:avLst/>
@@ -6837,6 +6867,7 @@
               </a:bodyPr>
               <a:lstStyle/>
               <a:p>
+                <a:pPr/>
                 <a14:m>
                   <m:oMathPara xmlns:m="http://schemas.openxmlformats.org/officeDocument/2006/math">
                     <m:oMathParaPr>
@@ -6844,10 +6875,10 @@
                     </m:oMathParaPr>
                     <m:oMath xmlns:m="http://schemas.openxmlformats.org/officeDocument/2006/math">
                       <m:r>
-                        <a:rPr lang="fr-FR" sz="2800" i="1">
+                        <a:rPr lang="fr-FR" sz="2800" b="0" i="1" smtClean="0">
                           <a:latin typeface="Cambria Math" panose="02040503050406030204" pitchFamily="18" charset="0"/>
                         </a:rPr>
-                        <m:t>𝒜</m:t>
+                        <m:t>𝑀</m:t>
                       </m:r>
                     </m:oMath>
                   </m:oMathPara>
@@ -6875,7 +6906,7 @@
             <p:spPr>
               <a:xfrm>
                 <a:off x="2775390" y="1546464"/>
-                <a:ext cx="416396" cy="430887"/>
+                <a:ext cx="396711" cy="430887"/>
               </a:xfrm>
               <a:prstGeom prst="rect">
                 <a:avLst/>
@@ -7027,8 +7058,8 @@
             <a:solidFill>
               <a:srgbClr val="0070C0"/>
             </a:solidFill>
-            <a:headEnd type="oval"/>
-            <a:tailEnd type="oval"/>
+            <a:headEnd type="oval" w="lg" len="lg"/>
+            <a:tailEnd type="oval" w="lg" len="lg"/>
           </a:ln>
         </p:spPr>
         <p:style>
@@ -9306,8 +9337,8 @@
             <a:solidFill>
               <a:schemeClr val="tx1"/>
             </a:solidFill>
-            <a:headEnd type="oval"/>
-            <a:tailEnd type="oval"/>
+            <a:headEnd type="oval" w="lg" len="lg"/>
+            <a:tailEnd type="oval" w="lg" len="lg"/>
           </a:ln>
         </p:spPr>
         <p:style>
@@ -9351,8 +9382,8 @@
             <a:solidFill>
               <a:schemeClr val="tx1"/>
             </a:solidFill>
-            <a:headEnd type="oval"/>
-            <a:tailEnd type="oval"/>
+            <a:headEnd type="oval" w="lg" len="lg"/>
+            <a:tailEnd type="oval" w="lg" len="lg"/>
           </a:ln>
         </p:spPr>
         <p:style>
@@ -9396,8 +9427,8 @@
             <a:solidFill>
               <a:schemeClr val="tx1"/>
             </a:solidFill>
-            <a:headEnd type="oval"/>
-            <a:tailEnd type="oval"/>
+            <a:headEnd type="oval" w="lg" len="lg"/>
+            <a:tailEnd type="oval" w="lg" len="lg"/>
           </a:ln>
         </p:spPr>
         <p:style>
@@ -9441,8 +9472,8 @@
             <a:solidFill>
               <a:schemeClr val="tx1"/>
             </a:solidFill>
-            <a:headEnd type="oval"/>
-            <a:tailEnd type="oval"/>
+            <a:headEnd type="oval" w="lg" len="lg"/>
+            <a:tailEnd type="oval" w="lg" len="lg"/>
           </a:ln>
         </p:spPr>
         <p:style>
@@ -9486,8 +9517,8 @@
             <a:solidFill>
               <a:schemeClr val="tx1"/>
             </a:solidFill>
-            <a:headEnd type="oval"/>
-            <a:tailEnd type="oval"/>
+            <a:headEnd type="oval" w="lg" len="lg"/>
+            <a:tailEnd type="oval" w="lg" len="lg"/>
           </a:ln>
         </p:spPr>
         <p:style>
@@ -9531,8 +9562,8 @@
             <a:solidFill>
               <a:schemeClr val="tx1"/>
             </a:solidFill>
-            <a:headEnd type="oval"/>
-            <a:tailEnd type="oval"/>
+            <a:headEnd type="oval" w="lg" len="lg"/>
+            <a:tailEnd type="oval" w="lg" len="lg"/>
           </a:ln>
         </p:spPr>
         <p:style>
@@ -9576,8 +9607,8 @@
             <a:solidFill>
               <a:schemeClr val="tx1"/>
             </a:solidFill>
-            <a:headEnd type="oval"/>
-            <a:tailEnd type="oval"/>
+            <a:headEnd type="oval" w="lg" len="lg"/>
+            <a:tailEnd type="oval" w="lg" len="lg"/>
           </a:ln>
         </p:spPr>
         <p:style>
@@ -9621,8 +9652,8 @@
             <a:solidFill>
               <a:schemeClr val="tx1"/>
             </a:solidFill>
-            <a:headEnd type="oval"/>
-            <a:tailEnd type="oval"/>
+            <a:headEnd type="oval" w="lg" len="lg"/>
+            <a:tailEnd type="oval" w="lg" len="lg"/>
           </a:ln>
         </p:spPr>
         <p:style>
@@ -9666,8 +9697,8 @@
             <a:solidFill>
               <a:srgbClr val="C00000"/>
             </a:solidFill>
-            <a:headEnd type="oval"/>
-            <a:tailEnd type="oval"/>
+            <a:headEnd type="oval" w="lg" len="lg"/>
+            <a:tailEnd type="oval" w="lg" len="lg"/>
           </a:ln>
         </p:spPr>
         <p:style>
@@ -9711,8 +9742,8 @@
             <a:solidFill>
               <a:srgbClr val="C00000"/>
             </a:solidFill>
-            <a:headEnd type="oval"/>
-            <a:tailEnd type="oval"/>
+            <a:headEnd type="oval" w="lg" len="lg"/>
+            <a:tailEnd type="oval" w="lg" len="lg"/>
           </a:ln>
         </p:spPr>
         <p:style>
@@ -9730,8 +9761,8 @@
           </a:fontRef>
         </p:style>
       </p:cxnSp>
-      <mc:AlternateContent xmlns:mc="http://schemas.openxmlformats.org/markup-compatibility/2006">
-        <mc:Choice xmlns:a14="http://schemas.microsoft.com/office/drawing/2010/main" Requires="a14">
+      <mc:AlternateContent xmlns:mc="http://schemas.openxmlformats.org/markup-compatibility/2006" xmlns:a14="http://schemas.microsoft.com/office/drawing/2010/main">
+        <mc:Choice Requires="a14">
           <p:sp>
             <p:nvSpPr>
               <p:cNvPr id="46" name="ZoneTexte 45">
@@ -9763,6 +9794,7 @@
               </a:bodyPr>
               <a:lstStyle/>
               <a:p>
+                <a:pPr/>
                 <a14:m>
                   <m:oMathPara xmlns:m="http://schemas.openxmlformats.org/officeDocument/2006/math">
                     <m:oMathParaPr>
@@ -9790,7 +9822,7 @@
             </p:txBody>
           </p:sp>
         </mc:Choice>
-        <mc:Fallback>
+        <mc:Fallback xmlns="">
           <p:sp>
             <p:nvSpPr>
               <p:cNvPr id="46" name="ZoneTexte 45">
@@ -9864,8 +9896,8 @@
             <a:solidFill>
               <a:srgbClr val="0070C0"/>
             </a:solidFill>
-            <a:headEnd type="oval"/>
-            <a:tailEnd type="oval"/>
+            <a:headEnd type="oval" w="lg" len="lg"/>
+            <a:tailEnd type="oval" w="lg" len="lg"/>
           </a:ln>
         </p:spPr>
         <p:style>
@@ -9945,7 +9977,7 @@
             <p:spPr>
               <a:xfrm>
                 <a:off x="2803252" y="1461285"/>
-                <a:ext cx="413510" cy="430887"/>
+                <a:ext cx="435119" cy="444417"/>
               </a:xfrm>
               <a:prstGeom prst="rect">
                 <a:avLst/>
@@ -9961,6 +9993,7 @@
               </a:bodyPr>
               <a:lstStyle/>
               <a:p>
+                <a:pPr/>
                 <a14:m>
                   <m:oMathPara xmlns:m="http://schemas.openxmlformats.org/officeDocument/2006/math">
                     <m:oMathParaPr>
@@ -9976,13 +10009,24 @@
                           </m:ctrlPr>
                         </m:sSubPr>
                         <m:e>
-                          <m:r>
-                            <a:rPr lang="fr-FR" sz="2800" i="1">
-                              <a:latin typeface="Cambria Math" panose="02040503050406030204" pitchFamily="18" charset="0"/>
-                              <a:ea typeface="Cambria Math" panose="02040503050406030204" pitchFamily="18" charset="0"/>
-                            </a:rPr>
-                            <m:t>ℐ</m:t>
-                          </m:r>
+                          <m:acc>
+                            <m:accPr>
+                              <m:chr m:val="̇"/>
+                              <m:ctrlPr>
+                                <a:rPr lang="fr-FR" sz="2800" i="1">
+                                  <a:latin typeface="Cambria Math" panose="02040503050406030204" pitchFamily="18" charset="0"/>
+                                </a:rPr>
+                              </m:ctrlPr>
+                            </m:accPr>
+                            <m:e>
+                              <m:r>
+                                <a:rPr lang="fr-FR" sz="2800" i="1">
+                                  <a:latin typeface="Cambria Math" panose="02040503050406030204" pitchFamily="18" charset="0"/>
+                                </a:rPr>
+                                <m:t>𝑇</m:t>
+                              </m:r>
+                            </m:e>
+                          </m:acc>
                         </m:e>
                         <m:sub>
                           <m:r>
@@ -10019,7 +10063,7 @@
             <p:spPr>
               <a:xfrm>
                 <a:off x="2803252" y="1461285"/>
-                <a:ext cx="413510" cy="430887"/>
+                <a:ext cx="435119" cy="444417"/>
               </a:xfrm>
               <a:prstGeom prst="rect">
                 <a:avLst/>
@@ -10066,7 +10110,7 @@
             <p:spPr>
               <a:xfrm>
                 <a:off x="1973320" y="3005620"/>
-                <a:ext cx="518283" cy="430887"/>
+                <a:ext cx="519886" cy="430887"/>
               </a:xfrm>
               <a:prstGeom prst="rect">
                 <a:avLst/>
@@ -10082,6 +10126,7 @@
               </a:bodyPr>
               <a:lstStyle/>
               <a:p>
+                <a:pPr/>
                 <a14:m>
                   <m:oMathPara xmlns:m="http://schemas.openxmlformats.org/officeDocument/2006/math">
                     <m:oMathParaPr>
@@ -10091,20 +10136,30 @@
                       <m:sSubSup>
                         <m:sSubSupPr>
                           <m:ctrlPr>
-                            <a:rPr lang="fr-FR" sz="2800" i="1">
+                            <a:rPr lang="fr-FR" sz="2800" b="0" i="0" smtClean="0">
                               <a:latin typeface="Cambria Math" panose="02040503050406030204" pitchFamily="18" charset="0"/>
-                              <a:ea typeface="Cambria Math" panose="02040503050406030204" pitchFamily="18" charset="0"/>
                             </a:rPr>
                           </m:ctrlPr>
                         </m:sSubSupPr>
                         <m:e>
-                          <m:r>
-                            <a:rPr lang="fr-FR" sz="2800" i="1">
-                              <a:latin typeface="Cambria Math" panose="02040503050406030204" pitchFamily="18" charset="0"/>
-                              <a:ea typeface="Cambria Math" panose="02040503050406030204" pitchFamily="18" charset="0"/>
-                            </a:rPr>
-                            <m:t>ℒ</m:t>
-                          </m:r>
+                          <m:acc>
+                            <m:accPr>
+                              <m:chr m:val="̅"/>
+                              <m:ctrlPr>
+                                <a:rPr lang="fr-FR" sz="2800" i="1">
+                                  <a:latin typeface="Cambria Math" panose="02040503050406030204" pitchFamily="18" charset="0"/>
+                                </a:rPr>
+                              </m:ctrlPr>
+                            </m:accPr>
+                            <m:e>
+                              <m:r>
+                                <a:rPr lang="fr-FR" sz="2800" i="1">
+                                  <a:latin typeface="Cambria Math" panose="02040503050406030204" pitchFamily="18" charset="0"/>
+                                </a:rPr>
+                                <m:t>𝑇</m:t>
+                              </m:r>
+                            </m:e>
+                          </m:acc>
                         </m:e>
                         <m:sub>
                           <m:r>
@@ -10116,9 +10171,8 @@
                         </m:sub>
                         <m:sup>
                           <m:r>
-                            <a:rPr lang="fr-FR" sz="2800" i="1">
+                            <a:rPr lang="fr-FR" sz="2800" b="0" i="0" smtClean="0">
                               <a:latin typeface="Cambria Math" panose="02040503050406030204" pitchFamily="18" charset="0"/>
-                              <a:ea typeface="Cambria Math" panose="02040503050406030204" pitchFamily="18" charset="0"/>
                             </a:rPr>
                             <m:t>−</m:t>
                           </m:r>
@@ -10150,7 +10204,7 @@
             <p:spPr>
               <a:xfrm>
                 <a:off x="1973320" y="3005620"/>
-                <a:ext cx="518283" cy="430887"/>
+                <a:ext cx="519886" cy="430887"/>
               </a:xfrm>
               <a:prstGeom prst="rect">
                 <a:avLst/>

</xml_diff>

<commit_message>
Update figures and text
</commit_message>
<xml_diff>
--- a/img/trees.pptx
+++ b/img/trees.pptx
@@ -200,7 +200,7 @@
           <a:p>
             <a:fld id="{7032D634-87B9-4515-9E90-7412EACBC911}" type="datetimeFigureOut">
               <a:rPr lang="fr-FR" smtClean="0"/>
-              <a:t>19/03/2020</a:t>
+              <a:t>23/03/2020</a:t>
             </a:fld>
             <a:endParaRPr lang="fr-FR"/>
           </a:p>
@@ -598,7 +598,7 @@
           <a:p>
             <a:fld id="{CC506755-3F84-4679-BA59-3527CD676A9A}" type="datetimeFigureOut">
               <a:rPr lang="fr-FR" smtClean="0"/>
-              <a:t>19/03/2020</a:t>
+              <a:t>23/03/2020</a:t>
             </a:fld>
             <a:endParaRPr lang="fr-FR"/>
           </a:p>
@@ -768,7 +768,7 @@
           <a:p>
             <a:fld id="{CC506755-3F84-4679-BA59-3527CD676A9A}" type="datetimeFigureOut">
               <a:rPr lang="fr-FR" smtClean="0"/>
-              <a:t>19/03/2020</a:t>
+              <a:t>23/03/2020</a:t>
             </a:fld>
             <a:endParaRPr lang="fr-FR"/>
           </a:p>
@@ -948,7 +948,7 @@
           <a:p>
             <a:fld id="{CC506755-3F84-4679-BA59-3527CD676A9A}" type="datetimeFigureOut">
               <a:rPr lang="fr-FR" smtClean="0"/>
-              <a:t>19/03/2020</a:t>
+              <a:t>23/03/2020</a:t>
             </a:fld>
             <a:endParaRPr lang="fr-FR"/>
           </a:p>
@@ -1118,7 +1118,7 @@
           <a:p>
             <a:fld id="{CC506755-3F84-4679-BA59-3527CD676A9A}" type="datetimeFigureOut">
               <a:rPr lang="fr-FR" smtClean="0"/>
-              <a:t>19/03/2020</a:t>
+              <a:t>23/03/2020</a:t>
             </a:fld>
             <a:endParaRPr lang="fr-FR"/>
           </a:p>
@@ -1362,7 +1362,7 @@
           <a:p>
             <a:fld id="{CC506755-3F84-4679-BA59-3527CD676A9A}" type="datetimeFigureOut">
               <a:rPr lang="fr-FR" smtClean="0"/>
-              <a:t>19/03/2020</a:t>
+              <a:t>23/03/2020</a:t>
             </a:fld>
             <a:endParaRPr lang="fr-FR"/>
           </a:p>
@@ -1594,7 +1594,7 @@
           <a:p>
             <a:fld id="{CC506755-3F84-4679-BA59-3527CD676A9A}" type="datetimeFigureOut">
               <a:rPr lang="fr-FR" smtClean="0"/>
-              <a:t>19/03/2020</a:t>
+              <a:t>23/03/2020</a:t>
             </a:fld>
             <a:endParaRPr lang="fr-FR"/>
           </a:p>
@@ -1961,7 +1961,7 @@
           <a:p>
             <a:fld id="{CC506755-3F84-4679-BA59-3527CD676A9A}" type="datetimeFigureOut">
               <a:rPr lang="fr-FR" smtClean="0"/>
-              <a:t>19/03/2020</a:t>
+              <a:t>23/03/2020</a:t>
             </a:fld>
             <a:endParaRPr lang="fr-FR"/>
           </a:p>
@@ -2079,7 +2079,7 @@
           <a:p>
             <a:fld id="{CC506755-3F84-4679-BA59-3527CD676A9A}" type="datetimeFigureOut">
               <a:rPr lang="fr-FR" smtClean="0"/>
-              <a:t>19/03/2020</a:t>
+              <a:t>23/03/2020</a:t>
             </a:fld>
             <a:endParaRPr lang="fr-FR"/>
           </a:p>
@@ -2174,7 +2174,7 @@
           <a:p>
             <a:fld id="{CC506755-3F84-4679-BA59-3527CD676A9A}" type="datetimeFigureOut">
               <a:rPr lang="fr-FR" smtClean="0"/>
-              <a:t>19/03/2020</a:t>
+              <a:t>23/03/2020</a:t>
             </a:fld>
             <a:endParaRPr lang="fr-FR"/>
           </a:p>
@@ -2451,7 +2451,7 @@
           <a:p>
             <a:fld id="{CC506755-3F84-4679-BA59-3527CD676A9A}" type="datetimeFigureOut">
               <a:rPr lang="fr-FR" smtClean="0"/>
-              <a:t>19/03/2020</a:t>
+              <a:t>23/03/2020</a:t>
             </a:fld>
             <a:endParaRPr lang="fr-FR"/>
           </a:p>
@@ -2708,7 +2708,7 @@
           <a:p>
             <a:fld id="{CC506755-3F84-4679-BA59-3527CD676A9A}" type="datetimeFigureOut">
               <a:rPr lang="fr-FR" smtClean="0"/>
-              <a:t>19/03/2020</a:t>
+              <a:t>23/03/2020</a:t>
             </a:fld>
             <a:endParaRPr lang="fr-FR"/>
           </a:p>
@@ -2921,7 +2921,7 @@
           <a:p>
             <a:fld id="{CC506755-3F84-4679-BA59-3527CD676A9A}" type="datetimeFigureOut">
               <a:rPr lang="fr-FR" smtClean="0"/>
-              <a:t>19/03/2020</a:t>
+              <a:t>23/03/2020</a:t>
             </a:fld>
             <a:endParaRPr lang="fr-FR"/>
           </a:p>
@@ -5073,8 +5073,8 @@
           </p:sp>
         </mc:Fallback>
       </mc:AlternateContent>
-      <mc:AlternateContent xmlns:mc="http://schemas.openxmlformats.org/markup-compatibility/2006" xmlns:a14="http://schemas.microsoft.com/office/drawing/2010/main">
-        <mc:Choice Requires="a14">
+      <mc:AlternateContent xmlns:mc="http://schemas.openxmlformats.org/markup-compatibility/2006">
+        <mc:Choice xmlns:a14="http://schemas.microsoft.com/office/drawing/2010/main" Requires="a14">
           <p:sp>
             <p:nvSpPr>
               <p:cNvPr id="42" name="ZoneTexte 41">
@@ -5089,8 +5089,8 @@
             </p:nvSpPr>
             <p:spPr>
               <a:xfrm>
-                <a:off x="1927728" y="2941478"/>
-                <a:ext cx="435119" cy="430887"/>
+                <a:off x="1786354" y="2982811"/>
+                <a:ext cx="644600" cy="430887"/>
               </a:xfrm>
               <a:prstGeom prst="rect">
                 <a:avLst/>
@@ -5113,6 +5113,12 @@
                       <m:jc m:val="centerGroup"/>
                     </m:oMathParaPr>
                     <m:oMath xmlns:m="http://schemas.openxmlformats.org/officeDocument/2006/math">
+                      <m:r>
+                        <a:rPr lang="fr-FR" sz="2800" b="0" i="1" smtClean="0">
+                          <a:latin typeface="Cambria Math" panose="02040503050406030204" pitchFamily="18" charset="0"/>
+                        </a:rPr>
+                        <m:t>𝜕</m:t>
+                      </m:r>
                       <m:sSub>
                         <m:sSubPr>
                           <m:ctrlPr>
@@ -5122,24 +5128,12 @@
                           </m:ctrlPr>
                         </m:sSubPr>
                         <m:e>
-                          <m:acc>
-                            <m:accPr>
-                              <m:chr m:val="̅"/>
-                              <m:ctrlPr>
-                                <a:rPr lang="fr-FR" sz="2800" i="1" smtClean="0">
-                                  <a:latin typeface="Cambria Math" panose="02040503050406030204" pitchFamily="18" charset="0"/>
-                                </a:rPr>
-                              </m:ctrlPr>
-                            </m:accPr>
-                            <m:e>
-                              <m:r>
-                                <a:rPr lang="fr-FR" sz="2800" b="0" i="1" smtClean="0">
-                                  <a:latin typeface="Cambria Math" panose="02040503050406030204" pitchFamily="18" charset="0"/>
-                                </a:rPr>
-                                <m:t>𝑇</m:t>
-                              </m:r>
-                            </m:e>
-                          </m:acc>
+                          <m:r>
+                            <a:rPr lang="fr-FR" sz="2800" b="0" i="1" smtClean="0">
+                              <a:latin typeface="Cambria Math" panose="02040503050406030204" pitchFamily="18" charset="0"/>
+                            </a:rPr>
+                            <m:t>𝑇</m:t>
+                          </m:r>
                         </m:e>
                         <m:sub>
                           <m:r>
@@ -5158,7 +5152,7 @@
             </p:txBody>
           </p:sp>
         </mc:Choice>
-        <mc:Fallback xmlns="">
+        <mc:Fallback>
           <p:sp>
             <p:nvSpPr>
               <p:cNvPr id="42" name="ZoneTexte 41">
@@ -5175,8 +5169,8 @@
             </p:nvSpPr>
             <p:spPr>
               <a:xfrm>
-                <a:off x="1927728" y="2941478"/>
-                <a:ext cx="435119" cy="430887"/>
+                <a:off x="1786354" y="2982811"/>
+                <a:ext cx="644600" cy="430887"/>
               </a:xfrm>
               <a:prstGeom prst="rect">
                 <a:avLst/>
@@ -6152,8 +6146,8 @@
           </a:fontRef>
         </p:style>
       </p:cxnSp>
-      <mc:AlternateContent xmlns:mc="http://schemas.openxmlformats.org/markup-compatibility/2006" xmlns:a14="http://schemas.microsoft.com/office/drawing/2010/main">
-        <mc:Choice Requires="a14">
+      <mc:AlternateContent xmlns:mc="http://schemas.openxmlformats.org/markup-compatibility/2006">
+        <mc:Choice xmlns:a14="http://schemas.microsoft.com/office/drawing/2010/main" Requires="a14">
           <p:sp>
             <p:nvSpPr>
               <p:cNvPr id="36" name="ZoneTexte 35">
@@ -6169,7 +6163,7 @@
             <p:spPr>
               <a:xfrm>
                 <a:off x="2744226" y="1626460"/>
-                <a:ext cx="336310" cy="430887"/>
+                <a:ext cx="475130" cy="430887"/>
               </a:xfrm>
               <a:prstGeom prst="rect">
                 <a:avLst/>
@@ -6192,12 +6186,31 @@
                       <m:jc m:val="centerGroup"/>
                     </m:oMathParaPr>
                     <m:oMath xmlns:m="http://schemas.openxmlformats.org/officeDocument/2006/math">
-                      <m:r>
-                        <a:rPr lang="fr-FR" sz="2800" b="0" i="1" smtClean="0">
-                          <a:latin typeface="Cambria Math" panose="02040503050406030204" pitchFamily="18" charset="0"/>
-                        </a:rPr>
-                        <m:t>𝐵</m:t>
-                      </m:r>
+                      <m:sSub>
+                        <m:sSubPr>
+                          <m:ctrlPr>
+                            <a:rPr lang="fr-FR" sz="2800" b="0" i="1" smtClean="0">
+                              <a:latin typeface="Cambria Math" panose="02040503050406030204" pitchFamily="18" charset="0"/>
+                            </a:rPr>
+                          </m:ctrlPr>
+                        </m:sSubPr>
+                        <m:e>
+                          <m:r>
+                            <a:rPr lang="fr-FR" sz="2800" b="0" i="1" smtClean="0">
+                              <a:latin typeface="Cambria Math" panose="02040503050406030204" pitchFamily="18" charset="0"/>
+                            </a:rPr>
+                            <m:t>𝐵</m:t>
+                          </m:r>
+                        </m:e>
+                        <m:sub>
+                          <m:r>
+                            <a:rPr lang="fr-FR" sz="2800" b="0" i="1" smtClean="0">
+                              <a:latin typeface="Cambria Math" panose="02040503050406030204" pitchFamily="18" charset="0"/>
+                            </a:rPr>
+                            <m:t>𝑛</m:t>
+                          </m:r>
+                        </m:sub>
+                      </m:sSub>
                     </m:oMath>
                   </m:oMathPara>
                 </a14:m>
@@ -6206,7 +6219,7 @@
             </p:txBody>
           </p:sp>
         </mc:Choice>
-        <mc:Fallback xmlns="">
+        <mc:Fallback>
           <p:sp>
             <p:nvSpPr>
               <p:cNvPr id="36" name="ZoneTexte 35">
@@ -6224,7 +6237,7 @@
             <p:spPr>
               <a:xfrm>
                 <a:off x="2744226" y="1626460"/>
-                <a:ext cx="336310" cy="430887"/>
+                <a:ext cx="475130" cy="430887"/>
               </a:xfrm>
               <a:prstGeom prst="rect">
                 <a:avLst/>
@@ -6840,8 +6853,8 @@
           </a:fontRef>
         </p:style>
       </p:cxnSp>
-      <mc:AlternateContent xmlns:mc="http://schemas.openxmlformats.org/markup-compatibility/2006" xmlns:a14="http://schemas.microsoft.com/office/drawing/2010/main">
-        <mc:Choice Requires="a14">
+      <mc:AlternateContent xmlns:mc="http://schemas.openxmlformats.org/markup-compatibility/2006">
+        <mc:Choice xmlns:a14="http://schemas.microsoft.com/office/drawing/2010/main" Requires="a14">
           <p:sp>
             <p:nvSpPr>
               <p:cNvPr id="46" name="ZoneTexte 45">
@@ -6857,7 +6870,7 @@
             <p:spPr>
               <a:xfrm>
                 <a:off x="2775390" y="1546464"/>
-                <a:ext cx="396711" cy="430887"/>
+                <a:ext cx="556178" cy="430887"/>
               </a:xfrm>
               <a:prstGeom prst="rect">
                 <a:avLst/>
@@ -6880,12 +6893,31 @@
                       <m:jc m:val="centerGroup"/>
                     </m:oMathParaPr>
                     <m:oMath xmlns:m="http://schemas.openxmlformats.org/officeDocument/2006/math">
-                      <m:r>
-                        <a:rPr lang="fr-FR" sz="2800" b="0" i="1" smtClean="0">
-                          <a:latin typeface="Cambria Math" panose="02040503050406030204" pitchFamily="18" charset="0"/>
-                        </a:rPr>
-                        <m:t>𝑀</m:t>
-                      </m:r>
+                      <m:sSub>
+                        <m:sSubPr>
+                          <m:ctrlPr>
+                            <a:rPr lang="fr-FR" sz="2800" b="0" i="1" smtClean="0">
+                              <a:latin typeface="Cambria Math" panose="02040503050406030204" pitchFamily="18" charset="0"/>
+                            </a:rPr>
+                          </m:ctrlPr>
+                        </m:sSubPr>
+                        <m:e>
+                          <m:r>
+                            <a:rPr lang="fr-FR" sz="2800" b="0" i="1" smtClean="0">
+                              <a:latin typeface="Cambria Math" panose="02040503050406030204" pitchFamily="18" charset="0"/>
+                            </a:rPr>
+                            <m:t>𝑀</m:t>
+                          </m:r>
+                        </m:e>
+                        <m:sub>
+                          <m:r>
+                            <a:rPr lang="fr-FR" sz="2800" b="0" i="1" smtClean="0">
+                              <a:latin typeface="Cambria Math" panose="02040503050406030204" pitchFamily="18" charset="0"/>
+                            </a:rPr>
+                            <m:t>𝑛</m:t>
+                          </m:r>
+                        </m:sub>
+                      </m:sSub>
                     </m:oMath>
                   </m:oMathPara>
                 </a14:m>
@@ -6894,7 +6926,7 @@
             </p:txBody>
           </p:sp>
         </mc:Choice>
-        <mc:Fallback xmlns="">
+        <mc:Fallback>
           <p:sp>
             <p:nvSpPr>
               <p:cNvPr id="46" name="ZoneTexte 45">
@@ -6912,7 +6944,7 @@
             <p:spPr>
               <a:xfrm>
                 <a:off x="2775390" y="1546464"/>
-                <a:ext cx="396711" cy="430887"/>
+                <a:ext cx="556178" cy="430887"/>
               </a:xfrm>
               <a:prstGeom prst="rect">
                 <a:avLst/>
@@ -7109,8 +7141,8 @@
             <a:solidFill>
               <a:srgbClr val="0070C0"/>
             </a:solidFill>
-            <a:headEnd type="oval"/>
-            <a:tailEnd type="oval"/>
+            <a:headEnd type="oval" w="lg" len="lg"/>
+            <a:tailEnd type="oval" w="lg" len="lg"/>
           </a:ln>
         </p:spPr>
         <p:style>
@@ -9771,8 +9803,8 @@
           </a:fontRef>
         </p:style>
       </p:cxnSp>
-      <mc:AlternateContent xmlns:mc="http://schemas.openxmlformats.org/markup-compatibility/2006" xmlns:a14="http://schemas.microsoft.com/office/drawing/2010/main">
-        <mc:Choice Requires="a14">
+      <mc:AlternateContent xmlns:mc="http://schemas.openxmlformats.org/markup-compatibility/2006">
+        <mc:Choice xmlns:a14="http://schemas.microsoft.com/office/drawing/2010/main" Requires="a14">
           <p:sp>
             <p:nvSpPr>
               <p:cNvPr id="46" name="ZoneTexte 45">
@@ -9788,7 +9820,7 @@
             <p:spPr>
               <a:xfrm>
                 <a:off x="4709999" y="1676728"/>
-                <a:ext cx="354456" cy="430887"/>
+                <a:ext cx="313355" cy="430887"/>
               </a:xfrm>
               <a:prstGeom prst="rect">
                 <a:avLst/>
@@ -9812,13 +9844,13 @@
                     </m:oMathParaPr>
                     <m:oMath xmlns:m="http://schemas.openxmlformats.org/officeDocument/2006/math">
                       <m:r>
-                        <a:rPr lang="fr-FR" sz="2800" i="1" smtClean="0">
+                        <a:rPr lang="fr-FR" sz="2800" b="0" i="1" smtClean="0">
                           <a:solidFill>
                             <a:schemeClr val="tx1"/>
                           </a:solidFill>
                           <a:latin typeface="Cambria Math" panose="02040503050406030204" pitchFamily="18" charset="0"/>
                         </a:rPr>
-                        <m:t>𝒫</m:t>
+                        <m:t>𝑃</m:t>
                       </m:r>
                     </m:oMath>
                   </m:oMathPara>
@@ -9832,7 +9864,7 @@
             </p:txBody>
           </p:sp>
         </mc:Choice>
-        <mc:Fallback xmlns="">
+        <mc:Fallback>
           <p:sp>
             <p:nvSpPr>
               <p:cNvPr id="46" name="ZoneTexte 45">
@@ -9850,7 +9882,7 @@
             <p:spPr>
               <a:xfrm>
                 <a:off x="4709999" y="1676728"/>
-                <a:ext cx="354456" cy="430887"/>
+                <a:ext cx="313355" cy="430887"/>
               </a:xfrm>
               <a:prstGeom prst="rect">
                 <a:avLst/>
@@ -9951,7 +9983,7 @@
             <a:solidFill>
               <a:srgbClr val="0070C0"/>
             </a:solidFill>
-            <a:headEnd type="oval"/>
+            <a:headEnd type="oval" w="lg" len="lg"/>
             <a:tailEnd type="oval"/>
           </a:ln>
         </p:spPr>
@@ -10107,10 +10139,10 @@
         <mc:Choice xmlns:a14="http://schemas.microsoft.com/office/drawing/2010/main" Requires="a14">
           <p:sp>
             <p:nvSpPr>
-              <p:cNvPr id="19" name="ZoneTexte 18">
+              <p:cNvPr id="22" name="ZoneTexte 21">
                 <a:extLst>
                   <a:ext uri="{FF2B5EF4-FFF2-40B4-BE49-F238E27FC236}">
-                    <a16:creationId xmlns:a16="http://schemas.microsoft.com/office/drawing/2014/main" id="{90B58EBD-DD5C-43AF-B482-26C90344DA63}"/>
+                    <a16:creationId xmlns:a16="http://schemas.microsoft.com/office/drawing/2014/main" id="{C9DAD919-B4A9-4316-85D2-1372814504B6}"/>
                   </a:ext>
                 </a:extLst>
               </p:cNvPr>
@@ -10119,8 +10151,8 @@
             </p:nvSpPr>
             <p:spPr>
               <a:xfrm>
-                <a:off x="1846685" y="2928006"/>
-                <a:ext cx="519886" cy="430887"/>
+                <a:off x="1617539" y="2855154"/>
+                <a:ext cx="729366" cy="430887"/>
               </a:xfrm>
               <a:prstGeom prst="rect">
                 <a:avLst/>
@@ -10143,6 +10175,12 @@
                       <m:jc m:val="centerGroup"/>
                     </m:oMathParaPr>
                     <m:oMath xmlns:m="http://schemas.openxmlformats.org/officeDocument/2006/math">
+                      <m:r>
+                        <a:rPr lang="fr-FR" sz="2800" b="0" i="1" smtClean="0">
+                          <a:latin typeface="Cambria Math" panose="02040503050406030204" pitchFamily="18" charset="0"/>
+                        </a:rPr>
+                        <m:t>𝜕</m:t>
+                      </m:r>
                       <m:sSubSup>
                         <m:sSubSupPr>
                           <m:ctrlPr>
@@ -10152,28 +10190,16 @@
                           </m:ctrlPr>
                         </m:sSubSupPr>
                         <m:e>
-                          <m:acc>
-                            <m:accPr>
-                              <m:chr m:val="̅"/>
-                              <m:ctrlPr>
-                                <a:rPr lang="fr-FR" sz="2800" i="1">
-                                  <a:latin typeface="Cambria Math" panose="02040503050406030204" pitchFamily="18" charset="0"/>
-                                </a:rPr>
-                              </m:ctrlPr>
-                            </m:accPr>
-                            <m:e>
-                              <m:r>
-                                <a:rPr lang="fr-FR" sz="2800" i="1">
-                                  <a:latin typeface="Cambria Math" panose="02040503050406030204" pitchFamily="18" charset="0"/>
-                                </a:rPr>
-                                <m:t>𝑇</m:t>
-                              </m:r>
-                            </m:e>
-                          </m:acc>
+                          <m:r>
+                            <a:rPr lang="fr-FR" sz="2800" b="0" i="1" smtClean="0">
+                              <a:latin typeface="Cambria Math" panose="02040503050406030204" pitchFamily="18" charset="0"/>
+                            </a:rPr>
+                            <m:t>𝑇</m:t>
+                          </m:r>
                         </m:e>
                         <m:sub>
                           <m:r>
-                            <a:rPr lang="fr-FR" sz="2800" i="1">
+                            <a:rPr lang="fr-FR" sz="2800" b="0" i="1" smtClean="0">
                               <a:latin typeface="Cambria Math" panose="02040503050406030204" pitchFamily="18" charset="0"/>
                             </a:rPr>
                             <m:t>𝑛</m:t>
@@ -10181,7 +10207,7 @@
                         </m:sub>
                         <m:sup>
                           <m:r>
-                            <a:rPr lang="fr-FR" sz="2800" b="0" i="0" smtClean="0">
+                            <a:rPr lang="fr-FR" sz="2800" b="0" i="1" smtClean="0">
                               <a:latin typeface="Cambria Math" panose="02040503050406030204" pitchFamily="18" charset="0"/>
                             </a:rPr>
                             <m:t>−</m:t>
@@ -10199,10 +10225,10 @@
         <mc:Fallback>
           <p:sp>
             <p:nvSpPr>
-              <p:cNvPr id="19" name="ZoneTexte 18">
+              <p:cNvPr id="22" name="ZoneTexte 21">
                 <a:extLst>
                   <a:ext uri="{FF2B5EF4-FFF2-40B4-BE49-F238E27FC236}">
-                    <a16:creationId xmlns:a16="http://schemas.microsoft.com/office/drawing/2014/main" id="{90B58EBD-DD5C-43AF-B482-26C90344DA63}"/>
+                    <a16:creationId xmlns:a16="http://schemas.microsoft.com/office/drawing/2014/main" id="{C9DAD919-B4A9-4316-85D2-1372814504B6}"/>
                   </a:ext>
                 </a:extLst>
               </p:cNvPr>
@@ -10213,8 +10239,8 @@
             </p:nvSpPr>
             <p:spPr>
               <a:xfrm>
-                <a:off x="1846685" y="2928006"/>
-                <a:ext cx="519886" cy="430887"/>
+                <a:off x="1617539" y="2855154"/>
+                <a:ext cx="729366" cy="430887"/>
               </a:xfrm>
               <a:prstGeom prst="rect">
                 <a:avLst/>
@@ -10244,96 +10270,159 @@
           </p:sp>
         </mc:Fallback>
       </mc:AlternateContent>
-      <p:cxnSp>
-        <p:nvCxnSpPr>
-          <p:cNvPr id="4" name="Connecteur droit 3">
-            <a:extLst>
-              <a:ext uri="{FF2B5EF4-FFF2-40B4-BE49-F238E27FC236}">
-                <a16:creationId xmlns:a16="http://schemas.microsoft.com/office/drawing/2014/main" id="{B99E611C-3FF6-49A5-8F0E-95D7A11B46CA}"/>
-              </a:ext>
-            </a:extLst>
-          </p:cNvPr>
-          <p:cNvCxnSpPr>
-            <a:cxnSpLocks/>
-          </p:cNvCxnSpPr>
-          <p:nvPr/>
-        </p:nvCxnSpPr>
-        <p:spPr>
-          <a:xfrm>
-            <a:off x="4597293" y="2309606"/>
-            <a:ext cx="371892" cy="308413"/>
-          </a:xfrm>
-          <a:prstGeom prst="line">
-            <a:avLst/>
-          </a:prstGeom>
-          <a:ln w="47625" cap="rnd">
-            <a:solidFill>
-              <a:srgbClr val="0070C0">
-                <a:alpha val="60000"/>
-              </a:srgbClr>
-            </a:solidFill>
-          </a:ln>
-        </p:spPr>
-        <p:style>
-          <a:lnRef idx="1">
-            <a:schemeClr val="accent1"/>
-          </a:lnRef>
-          <a:fillRef idx="0">
-            <a:schemeClr val="accent1"/>
-          </a:fillRef>
-          <a:effectRef idx="0">
-            <a:schemeClr val="accent1"/>
-          </a:effectRef>
-          <a:fontRef idx="minor">
-            <a:schemeClr val="tx1"/>
-          </a:fontRef>
-        </p:style>
-      </p:cxnSp>
-      <p:cxnSp>
-        <p:nvCxnSpPr>
-          <p:cNvPr id="24" name="Connecteur droit 23">
-            <a:extLst>
-              <a:ext uri="{FF2B5EF4-FFF2-40B4-BE49-F238E27FC236}">
-                <a16:creationId xmlns:a16="http://schemas.microsoft.com/office/drawing/2014/main" id="{E6DF486A-2F94-4DAD-A3FC-0FD45DAB3426}"/>
-              </a:ext>
-            </a:extLst>
-          </p:cNvPr>
-          <p:cNvCxnSpPr>
-            <a:cxnSpLocks/>
-          </p:cNvCxnSpPr>
-          <p:nvPr/>
-        </p:nvCxnSpPr>
-        <p:spPr>
-          <a:xfrm flipH="1">
-            <a:off x="4591894" y="2309605"/>
-            <a:ext cx="371892" cy="308413"/>
-          </a:xfrm>
-          <a:prstGeom prst="line">
-            <a:avLst/>
-          </a:prstGeom>
-          <a:ln w="47625" cap="rnd">
-            <a:solidFill>
-              <a:srgbClr val="0070C0">
-                <a:alpha val="60000"/>
-              </a:srgbClr>
-            </a:solidFill>
-          </a:ln>
-        </p:spPr>
-        <p:style>
-          <a:lnRef idx="1">
-            <a:schemeClr val="accent1"/>
-          </a:lnRef>
-          <a:fillRef idx="0">
-            <a:schemeClr val="accent1"/>
-          </a:fillRef>
-          <a:effectRef idx="0">
-            <a:schemeClr val="accent1"/>
-          </a:effectRef>
-          <a:fontRef idx="minor">
-            <a:schemeClr val="tx1"/>
-          </a:fontRef>
-        </p:style>
-      </p:cxnSp>
+      <mc:AlternateContent xmlns:mc="http://schemas.openxmlformats.org/markup-compatibility/2006">
+        <mc:Choice xmlns:a14="http://schemas.microsoft.com/office/drawing/2010/main" Requires="a14">
+          <p:sp>
+            <p:nvSpPr>
+              <p:cNvPr id="25" name="ZoneTexte 24">
+                <a:extLst>
+                  <a:ext uri="{FF2B5EF4-FFF2-40B4-BE49-F238E27FC236}">
+                    <a16:creationId xmlns:a16="http://schemas.microsoft.com/office/drawing/2014/main" id="{95AFB021-F4AC-4BA6-9C9C-D757CD46512A}"/>
+                  </a:ext>
+                </a:extLst>
+              </p:cNvPr>
+              <p:cNvSpPr txBox="1"/>
+              <p:nvPr/>
+            </p:nvSpPr>
+            <p:spPr>
+              <a:xfrm>
+                <a:off x="4783238" y="2978433"/>
+                <a:ext cx="644600" cy="430887"/>
+              </a:xfrm>
+              <a:prstGeom prst="rect">
+                <a:avLst/>
+              </a:prstGeom>
+              <a:noFill/>
+              <a:ln>
+                <a:noFill/>
+              </a:ln>
+            </p:spPr>
+            <p:txBody>
+              <a:bodyPr wrap="none" lIns="0" tIns="0" rIns="0" bIns="0" rtlCol="0">
+                <a:spAutoFit/>
+              </a:bodyPr>
+              <a:lstStyle/>
+              <a:p>
+                <a:pPr/>
+                <a14:m>
+                  <m:oMathPara xmlns:m="http://schemas.openxmlformats.org/officeDocument/2006/math">
+                    <m:oMathParaPr>
+                      <m:jc m:val="centerGroup"/>
+                    </m:oMathParaPr>
+                    <m:oMath xmlns:m="http://schemas.openxmlformats.org/officeDocument/2006/math">
+                      <m:r>
+                        <a:rPr lang="fr-FR" sz="2800" b="0" i="1" smtClean="0">
+                          <a:solidFill>
+                            <a:schemeClr val="bg2">
+                              <a:lumMod val="75000"/>
+                            </a:schemeClr>
+                          </a:solidFill>
+                          <a:latin typeface="Cambria Math" panose="02040503050406030204" pitchFamily="18" charset="0"/>
+                        </a:rPr>
+                        <m:t>𝜕</m:t>
+                      </m:r>
+                      <m:sSub>
+                        <m:sSubPr>
+                          <m:ctrlPr>
+                            <a:rPr lang="fr-FR" sz="2800" b="0" i="1" smtClean="0">
+                              <a:solidFill>
+                                <a:schemeClr val="bg2">
+                                  <a:lumMod val="75000"/>
+                                </a:schemeClr>
+                              </a:solidFill>
+                              <a:latin typeface="Cambria Math" panose="02040503050406030204" pitchFamily="18" charset="0"/>
+                            </a:rPr>
+                          </m:ctrlPr>
+                        </m:sSubPr>
+                        <m:e>
+                          <m:r>
+                            <a:rPr lang="fr-FR" sz="2800" b="0" i="1" smtClean="0">
+                              <a:solidFill>
+                                <a:schemeClr val="bg2">
+                                  <a:lumMod val="75000"/>
+                                </a:schemeClr>
+                              </a:solidFill>
+                              <a:latin typeface="Cambria Math" panose="02040503050406030204" pitchFamily="18" charset="0"/>
+                            </a:rPr>
+                            <m:t>𝑇</m:t>
+                          </m:r>
+                        </m:e>
+                        <m:sub>
+                          <m:r>
+                            <a:rPr lang="fr-FR" sz="2800" b="0" i="1" smtClean="0">
+                              <a:solidFill>
+                                <a:schemeClr val="bg2">
+                                  <a:lumMod val="75000"/>
+                                </a:schemeClr>
+                              </a:solidFill>
+                              <a:latin typeface="Cambria Math" panose="02040503050406030204" pitchFamily="18" charset="0"/>
+                            </a:rPr>
+                            <m:t>𝑛</m:t>
+                          </m:r>
+                        </m:sub>
+                      </m:sSub>
+                    </m:oMath>
+                  </m:oMathPara>
+                </a14:m>
+                <a:endParaRPr lang="fr-FR" sz="2800" dirty="0">
+                  <a:solidFill>
+                    <a:schemeClr val="bg2">
+                      <a:lumMod val="75000"/>
+                    </a:schemeClr>
+                  </a:solidFill>
+                </a:endParaRPr>
+              </a:p>
+            </p:txBody>
+          </p:sp>
+        </mc:Choice>
+        <mc:Fallback>
+          <p:sp>
+            <p:nvSpPr>
+              <p:cNvPr id="25" name="ZoneTexte 24">
+                <a:extLst>
+                  <a:ext uri="{FF2B5EF4-FFF2-40B4-BE49-F238E27FC236}">
+                    <a16:creationId xmlns:a16="http://schemas.microsoft.com/office/drawing/2014/main" id="{95AFB021-F4AC-4BA6-9C9C-D757CD46512A}"/>
+                  </a:ext>
+                </a:extLst>
+              </p:cNvPr>
+              <p:cNvSpPr txBox="1">
+                <a:spLocks noRot="1" noChangeAspect="1" noMove="1" noResize="1" noEditPoints="1" noAdjustHandles="1" noChangeArrowheads="1" noChangeShapeType="1" noTextEdit="1"/>
+              </p:cNvSpPr>
+              <p:nvPr/>
+            </p:nvSpPr>
+            <p:spPr>
+              <a:xfrm>
+                <a:off x="4783238" y="2978433"/>
+                <a:ext cx="644600" cy="430887"/>
+              </a:xfrm>
+              <a:prstGeom prst="rect">
+                <a:avLst/>
+              </a:prstGeom>
+              <a:blipFill>
+                <a:blip r:embed="rId5"/>
+                <a:stretch>
+                  <a:fillRect/>
+                </a:stretch>
+              </a:blipFill>
+              <a:ln>
+                <a:noFill/>
+              </a:ln>
+            </p:spPr>
+            <p:txBody>
+              <a:bodyPr/>
+              <a:lstStyle/>
+              <a:p>
+                <a:r>
+                  <a:rPr lang="fr-FR">
+                    <a:noFill/>
+                  </a:rPr>
+                  <a:t> </a:t>
+                </a:r>
+              </a:p>
+            </p:txBody>
+          </p:sp>
+        </mc:Fallback>
+      </mc:AlternateContent>
     </p:spTree>
     <p:extLst>
       <p:ext uri="{BB962C8B-B14F-4D97-AF65-F5344CB8AC3E}">

</xml_diff>

<commit_message>
New formulation with unrolled graph
</commit_message>
<xml_diff>
--- a/img/trees.pptx
+++ b/img/trees.pptx
@@ -5,13 +5,14 @@
     <p:sldMasterId id="2147483684" r:id="rId1"/>
   </p:sldMasterIdLst>
   <p:notesMasterIdLst>
-    <p:notesMasterId r:id="rId6"/>
+    <p:notesMasterId r:id="rId7"/>
   </p:notesMasterIdLst>
   <p:sldIdLst>
     <p:sldId id="256" r:id="rId2"/>
     <p:sldId id="257" r:id="rId3"/>
     <p:sldId id="258" r:id="rId4"/>
     <p:sldId id="259" r:id="rId5"/>
+    <p:sldId id="261" r:id="rId6"/>
   </p:sldIdLst>
   <p:sldSz cx="5759450" cy="4679950"/>
   <p:notesSz cx="6858000" cy="9144000"/>
@@ -200,7 +201,7 @@
           <a:p>
             <a:fld id="{7032D634-87B9-4515-9E90-7412EACBC911}" type="datetimeFigureOut">
               <a:rPr lang="fr-FR" smtClean="0"/>
-              <a:t>23/03/2020</a:t>
+              <a:t>30/03/2020</a:t>
             </a:fld>
             <a:endParaRPr lang="fr-FR"/>
           </a:p>
@@ -598,7 +599,7 @@
           <a:p>
             <a:fld id="{CC506755-3F84-4679-BA59-3527CD676A9A}" type="datetimeFigureOut">
               <a:rPr lang="fr-FR" smtClean="0"/>
-              <a:t>23/03/2020</a:t>
+              <a:t>30/03/2020</a:t>
             </a:fld>
             <a:endParaRPr lang="fr-FR"/>
           </a:p>
@@ -768,7 +769,7 @@
           <a:p>
             <a:fld id="{CC506755-3F84-4679-BA59-3527CD676A9A}" type="datetimeFigureOut">
               <a:rPr lang="fr-FR" smtClean="0"/>
-              <a:t>23/03/2020</a:t>
+              <a:t>30/03/2020</a:t>
             </a:fld>
             <a:endParaRPr lang="fr-FR"/>
           </a:p>
@@ -948,7 +949,7 @@
           <a:p>
             <a:fld id="{CC506755-3F84-4679-BA59-3527CD676A9A}" type="datetimeFigureOut">
               <a:rPr lang="fr-FR" smtClean="0"/>
-              <a:t>23/03/2020</a:t>
+              <a:t>30/03/2020</a:t>
             </a:fld>
             <a:endParaRPr lang="fr-FR"/>
           </a:p>
@@ -1118,7 +1119,7 @@
           <a:p>
             <a:fld id="{CC506755-3F84-4679-BA59-3527CD676A9A}" type="datetimeFigureOut">
               <a:rPr lang="fr-FR" smtClean="0"/>
-              <a:t>23/03/2020</a:t>
+              <a:t>30/03/2020</a:t>
             </a:fld>
             <a:endParaRPr lang="fr-FR"/>
           </a:p>
@@ -1362,7 +1363,7 @@
           <a:p>
             <a:fld id="{CC506755-3F84-4679-BA59-3527CD676A9A}" type="datetimeFigureOut">
               <a:rPr lang="fr-FR" smtClean="0"/>
-              <a:t>23/03/2020</a:t>
+              <a:t>30/03/2020</a:t>
             </a:fld>
             <a:endParaRPr lang="fr-FR"/>
           </a:p>
@@ -1594,7 +1595,7 @@
           <a:p>
             <a:fld id="{CC506755-3F84-4679-BA59-3527CD676A9A}" type="datetimeFigureOut">
               <a:rPr lang="fr-FR" smtClean="0"/>
-              <a:t>23/03/2020</a:t>
+              <a:t>30/03/2020</a:t>
             </a:fld>
             <a:endParaRPr lang="fr-FR"/>
           </a:p>
@@ -1961,7 +1962,7 @@
           <a:p>
             <a:fld id="{CC506755-3F84-4679-BA59-3527CD676A9A}" type="datetimeFigureOut">
               <a:rPr lang="fr-FR" smtClean="0"/>
-              <a:t>23/03/2020</a:t>
+              <a:t>30/03/2020</a:t>
             </a:fld>
             <a:endParaRPr lang="fr-FR"/>
           </a:p>
@@ -2079,7 +2080,7 @@
           <a:p>
             <a:fld id="{CC506755-3F84-4679-BA59-3527CD676A9A}" type="datetimeFigureOut">
               <a:rPr lang="fr-FR" smtClean="0"/>
-              <a:t>23/03/2020</a:t>
+              <a:t>30/03/2020</a:t>
             </a:fld>
             <a:endParaRPr lang="fr-FR"/>
           </a:p>
@@ -2174,7 +2175,7 @@
           <a:p>
             <a:fld id="{CC506755-3F84-4679-BA59-3527CD676A9A}" type="datetimeFigureOut">
               <a:rPr lang="fr-FR" smtClean="0"/>
-              <a:t>23/03/2020</a:t>
+              <a:t>30/03/2020</a:t>
             </a:fld>
             <a:endParaRPr lang="fr-FR"/>
           </a:p>
@@ -2451,7 +2452,7 @@
           <a:p>
             <a:fld id="{CC506755-3F84-4679-BA59-3527CD676A9A}" type="datetimeFigureOut">
               <a:rPr lang="fr-FR" smtClean="0"/>
-              <a:t>23/03/2020</a:t>
+              <a:t>30/03/2020</a:t>
             </a:fld>
             <a:endParaRPr lang="fr-FR"/>
           </a:p>
@@ -2708,7 +2709,7 @@
           <a:p>
             <a:fld id="{CC506755-3F84-4679-BA59-3527CD676A9A}" type="datetimeFigureOut">
               <a:rPr lang="fr-FR" smtClean="0"/>
-              <a:t>23/03/2020</a:t>
+              <a:t>30/03/2020</a:t>
             </a:fld>
             <a:endParaRPr lang="fr-FR"/>
           </a:p>
@@ -2921,7 +2922,7 @@
           <a:p>
             <a:fld id="{CC506755-3F84-4679-BA59-3527CD676A9A}" type="datetimeFigureOut">
               <a:rPr lang="fr-FR" smtClean="0"/>
-              <a:t>23/03/2020</a:t>
+              <a:t>30/03/2020</a:t>
             </a:fld>
             <a:endParaRPr lang="fr-FR"/>
           </a:p>
@@ -5073,8 +5074,8 @@
           </p:sp>
         </mc:Fallback>
       </mc:AlternateContent>
-      <mc:AlternateContent xmlns:mc="http://schemas.openxmlformats.org/markup-compatibility/2006">
-        <mc:Choice xmlns:a14="http://schemas.microsoft.com/office/drawing/2010/main" Requires="a14">
+      <mc:AlternateContent xmlns:mc="http://schemas.openxmlformats.org/markup-compatibility/2006" xmlns:a14="http://schemas.microsoft.com/office/drawing/2010/main">
+        <mc:Choice Requires="a14">
           <p:sp>
             <p:nvSpPr>
               <p:cNvPr id="42" name="ZoneTexte 41">
@@ -5152,7 +5153,7 @@
             </p:txBody>
           </p:sp>
         </mc:Choice>
-        <mc:Fallback>
+        <mc:Fallback xmlns="">
           <p:sp>
             <p:nvSpPr>
               <p:cNvPr id="42" name="ZoneTexte 41">
@@ -6146,8 +6147,8 @@
           </a:fontRef>
         </p:style>
       </p:cxnSp>
-      <mc:AlternateContent xmlns:mc="http://schemas.openxmlformats.org/markup-compatibility/2006">
-        <mc:Choice xmlns:a14="http://schemas.microsoft.com/office/drawing/2010/main" Requires="a14">
+      <mc:AlternateContent xmlns:mc="http://schemas.openxmlformats.org/markup-compatibility/2006" xmlns:a14="http://schemas.microsoft.com/office/drawing/2010/main">
+        <mc:Choice Requires="a14">
           <p:sp>
             <p:nvSpPr>
               <p:cNvPr id="36" name="ZoneTexte 35">
@@ -6219,7 +6220,7 @@
             </p:txBody>
           </p:sp>
         </mc:Choice>
-        <mc:Fallback>
+        <mc:Fallback xmlns="">
           <p:sp>
             <p:nvSpPr>
               <p:cNvPr id="36" name="ZoneTexte 35">
@@ -6853,8 +6854,8 @@
           </a:fontRef>
         </p:style>
       </p:cxnSp>
-      <mc:AlternateContent xmlns:mc="http://schemas.openxmlformats.org/markup-compatibility/2006">
-        <mc:Choice xmlns:a14="http://schemas.microsoft.com/office/drawing/2010/main" Requires="a14">
+      <mc:AlternateContent xmlns:mc="http://schemas.openxmlformats.org/markup-compatibility/2006" xmlns:a14="http://schemas.microsoft.com/office/drawing/2010/main">
+        <mc:Choice Requires="a14">
           <p:sp>
             <p:nvSpPr>
               <p:cNvPr id="46" name="ZoneTexte 45">
@@ -6926,7 +6927,7 @@
             </p:txBody>
           </p:sp>
         </mc:Choice>
-        <mc:Fallback>
+        <mc:Fallback xmlns="">
           <p:sp>
             <p:nvSpPr>
               <p:cNvPr id="46" name="ZoneTexte 45">
@@ -9803,8 +9804,8 @@
           </a:fontRef>
         </p:style>
       </p:cxnSp>
-      <mc:AlternateContent xmlns:mc="http://schemas.openxmlformats.org/markup-compatibility/2006">
-        <mc:Choice xmlns:a14="http://schemas.microsoft.com/office/drawing/2010/main" Requires="a14">
+      <mc:AlternateContent xmlns:mc="http://schemas.openxmlformats.org/markup-compatibility/2006" xmlns:a14="http://schemas.microsoft.com/office/drawing/2010/main">
+        <mc:Choice Requires="a14">
           <p:sp>
             <p:nvSpPr>
               <p:cNvPr id="46" name="ZoneTexte 45">
@@ -9864,7 +9865,7 @@
             </p:txBody>
           </p:sp>
         </mc:Choice>
-        <mc:Fallback>
+        <mc:Fallback xmlns="">
           <p:sp>
             <p:nvSpPr>
               <p:cNvPr id="46" name="ZoneTexte 45">
@@ -10135,8 +10136,8 @@
           </p:sp>
         </mc:Fallback>
       </mc:AlternateContent>
-      <mc:AlternateContent xmlns:mc="http://schemas.openxmlformats.org/markup-compatibility/2006">
-        <mc:Choice xmlns:a14="http://schemas.microsoft.com/office/drawing/2010/main" Requires="a14">
+      <mc:AlternateContent xmlns:mc="http://schemas.openxmlformats.org/markup-compatibility/2006" xmlns:a14="http://schemas.microsoft.com/office/drawing/2010/main">
+        <mc:Choice Requires="a14">
           <p:sp>
             <p:nvSpPr>
               <p:cNvPr id="22" name="ZoneTexte 21">
@@ -10222,7 +10223,7 @@
             </p:txBody>
           </p:sp>
         </mc:Choice>
-        <mc:Fallback>
+        <mc:Fallback xmlns="">
           <p:sp>
             <p:nvSpPr>
               <p:cNvPr id="22" name="ZoneTexte 21">
@@ -10270,8 +10271,8 @@
           </p:sp>
         </mc:Fallback>
       </mc:AlternateContent>
-      <mc:AlternateContent xmlns:mc="http://schemas.openxmlformats.org/markup-compatibility/2006">
-        <mc:Choice xmlns:a14="http://schemas.microsoft.com/office/drawing/2010/main" Requires="a14">
+      <mc:AlternateContent xmlns:mc="http://schemas.openxmlformats.org/markup-compatibility/2006" xmlns:a14="http://schemas.microsoft.com/office/drawing/2010/main">
+        <mc:Choice Requires="a14">
           <p:sp>
             <p:nvSpPr>
               <p:cNvPr id="25" name="ZoneTexte 24">
@@ -10375,7 +10376,7 @@
             </p:txBody>
           </p:sp>
         </mc:Choice>
-        <mc:Fallback>
+        <mc:Fallback xmlns="">
           <p:sp>
             <p:nvSpPr>
               <p:cNvPr id="25" name="ZoneTexte 24">
@@ -10427,6 +10428,895 @@
     <p:extLst>
       <p:ext uri="{BB962C8B-B14F-4D97-AF65-F5344CB8AC3E}">
         <p14:creationId xmlns:p14="http://schemas.microsoft.com/office/powerpoint/2010/main" val="1167236216"/>
+      </p:ext>
+    </p:extLst>
+  </p:cSld>
+  <p:clrMapOvr>
+    <a:masterClrMapping/>
+  </p:clrMapOvr>
+</p:sld>
+</file>
+
+<file path=ppt/slides/slide5.xml><?xml version="1.0" encoding="utf-8"?>
+<p:sld xmlns:a="http://schemas.openxmlformats.org/drawingml/2006/main" xmlns:r="http://schemas.openxmlformats.org/officeDocument/2006/relationships" xmlns:p="http://schemas.openxmlformats.org/presentationml/2006/main">
+  <p:cSld>
+    <p:spTree>
+      <p:nvGrpSpPr>
+        <p:cNvPr id="1" name=""/>
+        <p:cNvGrpSpPr/>
+        <p:nvPr/>
+      </p:nvGrpSpPr>
+      <p:grpSpPr>
+        <a:xfrm>
+          <a:off x="0" y="0"/>
+          <a:ext cx="0" cy="0"/>
+          <a:chOff x="0" y="0"/>
+          <a:chExt cx="0" cy="0"/>
+        </a:xfrm>
+      </p:grpSpPr>
+      <p:cxnSp>
+        <p:nvCxnSpPr>
+          <p:cNvPr id="8" name="Connecteur droit 7">
+            <a:extLst>
+              <a:ext uri="{FF2B5EF4-FFF2-40B4-BE49-F238E27FC236}">
+                <a16:creationId xmlns:a16="http://schemas.microsoft.com/office/drawing/2014/main" id="{B590882D-75B9-4F2C-BB0A-3509DF3F5775}"/>
+              </a:ext>
+            </a:extLst>
+          </p:cNvPr>
+          <p:cNvCxnSpPr>
+            <a:cxnSpLocks/>
+          </p:cNvCxnSpPr>
+          <p:nvPr/>
+        </p:nvCxnSpPr>
+        <p:spPr>
+          <a:xfrm flipH="1" flipV="1">
+            <a:off x="2828505" y="106132"/>
+            <a:ext cx="1274618" cy="735900"/>
+          </a:xfrm>
+          <a:prstGeom prst="line">
+            <a:avLst/>
+          </a:prstGeom>
+          <a:ln>
+            <a:solidFill>
+              <a:schemeClr val="tx1"/>
+            </a:solidFill>
+            <a:headEnd type="oval" w="lg" len="lg"/>
+            <a:tailEnd type="oval" w="lg" len="lg"/>
+          </a:ln>
+        </p:spPr>
+        <p:style>
+          <a:lnRef idx="1">
+            <a:schemeClr val="accent1"/>
+          </a:lnRef>
+          <a:fillRef idx="0">
+            <a:schemeClr val="accent1"/>
+          </a:fillRef>
+          <a:effectRef idx="0">
+            <a:schemeClr val="accent1"/>
+          </a:effectRef>
+          <a:fontRef idx="minor">
+            <a:schemeClr val="tx1"/>
+          </a:fontRef>
+        </p:style>
+      </p:cxnSp>
+      <p:cxnSp>
+        <p:nvCxnSpPr>
+          <p:cNvPr id="13" name="Connecteur droit 12">
+            <a:extLst>
+              <a:ext uri="{FF2B5EF4-FFF2-40B4-BE49-F238E27FC236}">
+                <a16:creationId xmlns:a16="http://schemas.microsoft.com/office/drawing/2014/main" id="{72AD44D8-127E-4921-99FE-5D89133262C8}"/>
+              </a:ext>
+            </a:extLst>
+          </p:cNvPr>
+          <p:cNvCxnSpPr>
+            <a:cxnSpLocks/>
+          </p:cNvCxnSpPr>
+          <p:nvPr/>
+        </p:nvCxnSpPr>
+        <p:spPr>
+          <a:xfrm flipV="1">
+            <a:off x="1553887" y="106132"/>
+            <a:ext cx="1274618" cy="735900"/>
+          </a:xfrm>
+          <a:prstGeom prst="line">
+            <a:avLst/>
+          </a:prstGeom>
+          <a:ln>
+            <a:solidFill>
+              <a:schemeClr val="tx1"/>
+            </a:solidFill>
+            <a:headEnd type="oval" w="lg" len="lg"/>
+            <a:tailEnd type="oval" w="lg" len="lg"/>
+          </a:ln>
+        </p:spPr>
+        <p:style>
+          <a:lnRef idx="1">
+            <a:schemeClr val="accent1"/>
+          </a:lnRef>
+          <a:fillRef idx="0">
+            <a:schemeClr val="accent1"/>
+          </a:fillRef>
+          <a:effectRef idx="0">
+            <a:schemeClr val="accent1"/>
+          </a:effectRef>
+          <a:fontRef idx="minor">
+            <a:schemeClr val="tx1"/>
+          </a:fontRef>
+        </p:style>
+      </p:cxnSp>
+      <p:cxnSp>
+        <p:nvCxnSpPr>
+          <p:cNvPr id="17" name="Connecteur droit 16">
+            <a:extLst>
+              <a:ext uri="{FF2B5EF4-FFF2-40B4-BE49-F238E27FC236}">
+                <a16:creationId xmlns:a16="http://schemas.microsoft.com/office/drawing/2014/main" id="{49003990-6690-44A1-9960-7122938DE4E7}"/>
+              </a:ext>
+            </a:extLst>
+          </p:cNvPr>
+          <p:cNvCxnSpPr>
+            <a:cxnSpLocks/>
+          </p:cNvCxnSpPr>
+          <p:nvPr/>
+        </p:nvCxnSpPr>
+        <p:spPr>
+          <a:xfrm flipV="1">
+            <a:off x="3486673" y="842042"/>
+            <a:ext cx="617551" cy="1127461"/>
+          </a:xfrm>
+          <a:prstGeom prst="line">
+            <a:avLst/>
+          </a:prstGeom>
+          <a:ln>
+            <a:solidFill>
+              <a:schemeClr val="tx1"/>
+            </a:solidFill>
+            <a:headEnd type="oval" w="lg" len="lg"/>
+            <a:tailEnd type="oval" w="lg" len="lg"/>
+          </a:ln>
+        </p:spPr>
+        <p:style>
+          <a:lnRef idx="1">
+            <a:schemeClr val="accent1"/>
+          </a:lnRef>
+          <a:fillRef idx="0">
+            <a:schemeClr val="accent1"/>
+          </a:fillRef>
+          <a:effectRef idx="0">
+            <a:schemeClr val="accent1"/>
+          </a:effectRef>
+          <a:fontRef idx="minor">
+            <a:schemeClr val="tx1"/>
+          </a:fontRef>
+        </p:style>
+      </p:cxnSp>
+      <p:cxnSp>
+        <p:nvCxnSpPr>
+          <p:cNvPr id="20" name="Connecteur droit 19">
+            <a:extLst>
+              <a:ext uri="{FF2B5EF4-FFF2-40B4-BE49-F238E27FC236}">
+                <a16:creationId xmlns:a16="http://schemas.microsoft.com/office/drawing/2014/main" id="{6001CC11-55A5-4F99-A4E1-E81488EF21C6}"/>
+              </a:ext>
+            </a:extLst>
+          </p:cNvPr>
+          <p:cNvCxnSpPr>
+            <a:cxnSpLocks/>
+          </p:cNvCxnSpPr>
+          <p:nvPr/>
+        </p:nvCxnSpPr>
+        <p:spPr>
+          <a:xfrm flipV="1">
+            <a:off x="3140154" y="1969491"/>
+            <a:ext cx="345754" cy="1383043"/>
+          </a:xfrm>
+          <a:prstGeom prst="line">
+            <a:avLst/>
+          </a:prstGeom>
+          <a:ln>
+            <a:solidFill>
+              <a:schemeClr val="tx1"/>
+            </a:solidFill>
+            <a:headEnd type="oval" w="lg" len="lg"/>
+            <a:tailEnd type="oval" w="lg" len="lg"/>
+          </a:ln>
+        </p:spPr>
+        <p:style>
+          <a:lnRef idx="1">
+            <a:schemeClr val="accent1"/>
+          </a:lnRef>
+          <a:fillRef idx="0">
+            <a:schemeClr val="accent1"/>
+          </a:fillRef>
+          <a:effectRef idx="0">
+            <a:schemeClr val="accent1"/>
+          </a:effectRef>
+          <a:fontRef idx="minor">
+            <a:schemeClr val="tx1"/>
+          </a:fontRef>
+        </p:style>
+      </p:cxnSp>
+      <p:cxnSp>
+        <p:nvCxnSpPr>
+          <p:cNvPr id="24" name="Connecteur droit 23">
+            <a:extLst>
+              <a:ext uri="{FF2B5EF4-FFF2-40B4-BE49-F238E27FC236}">
+                <a16:creationId xmlns:a16="http://schemas.microsoft.com/office/drawing/2014/main" id="{E4EBB299-1B7E-4D35-8D3D-5C9EF35F4E4E}"/>
+              </a:ext>
+            </a:extLst>
+          </p:cNvPr>
+          <p:cNvCxnSpPr>
+            <a:cxnSpLocks/>
+          </p:cNvCxnSpPr>
+          <p:nvPr/>
+        </p:nvCxnSpPr>
+        <p:spPr>
+          <a:xfrm flipH="1" flipV="1">
+            <a:off x="4102036" y="842042"/>
+            <a:ext cx="617551" cy="1127461"/>
+          </a:xfrm>
+          <a:prstGeom prst="line">
+            <a:avLst/>
+          </a:prstGeom>
+          <a:ln>
+            <a:solidFill>
+              <a:schemeClr val="tx1"/>
+            </a:solidFill>
+            <a:headEnd type="oval"/>
+            <a:tailEnd type="oval"/>
+          </a:ln>
+        </p:spPr>
+        <p:style>
+          <a:lnRef idx="1">
+            <a:schemeClr val="accent1"/>
+          </a:lnRef>
+          <a:fillRef idx="0">
+            <a:schemeClr val="accent1"/>
+          </a:fillRef>
+          <a:effectRef idx="0">
+            <a:schemeClr val="accent1"/>
+          </a:effectRef>
+          <a:fontRef idx="minor">
+            <a:schemeClr val="tx1"/>
+          </a:fontRef>
+        </p:style>
+      </p:cxnSp>
+      <p:cxnSp>
+        <p:nvCxnSpPr>
+          <p:cNvPr id="26" name="Connecteur droit 25">
+            <a:extLst>
+              <a:ext uri="{FF2B5EF4-FFF2-40B4-BE49-F238E27FC236}">
+                <a16:creationId xmlns:a16="http://schemas.microsoft.com/office/drawing/2014/main" id="{8EAB9239-B0C5-4050-9BB9-134C03E36E9B}"/>
+              </a:ext>
+            </a:extLst>
+          </p:cNvPr>
+          <p:cNvCxnSpPr>
+            <a:cxnSpLocks/>
+          </p:cNvCxnSpPr>
+          <p:nvPr/>
+        </p:nvCxnSpPr>
+        <p:spPr>
+          <a:xfrm flipH="1" flipV="1">
+            <a:off x="3487759" y="1969491"/>
+            <a:ext cx="345754" cy="1383043"/>
+          </a:xfrm>
+          <a:prstGeom prst="line">
+            <a:avLst/>
+          </a:prstGeom>
+          <a:ln>
+            <a:solidFill>
+              <a:schemeClr val="tx1"/>
+            </a:solidFill>
+            <a:headEnd type="oval"/>
+            <a:tailEnd type="oval"/>
+          </a:ln>
+        </p:spPr>
+        <p:style>
+          <a:lnRef idx="1">
+            <a:schemeClr val="accent1"/>
+          </a:lnRef>
+          <a:fillRef idx="0">
+            <a:schemeClr val="accent1"/>
+          </a:fillRef>
+          <a:effectRef idx="0">
+            <a:schemeClr val="accent1"/>
+          </a:effectRef>
+          <a:fontRef idx="minor">
+            <a:schemeClr val="tx1"/>
+          </a:fontRef>
+        </p:style>
+      </p:cxnSp>
+      <p:cxnSp>
+        <p:nvCxnSpPr>
+          <p:cNvPr id="27" name="Connecteur droit 26">
+            <a:extLst>
+              <a:ext uri="{FF2B5EF4-FFF2-40B4-BE49-F238E27FC236}">
+                <a16:creationId xmlns:a16="http://schemas.microsoft.com/office/drawing/2014/main" id="{30507068-AC44-49BA-AFE1-077A1C0448CC}"/>
+              </a:ext>
+            </a:extLst>
+          </p:cNvPr>
+          <p:cNvCxnSpPr>
+            <a:cxnSpLocks/>
+          </p:cNvCxnSpPr>
+          <p:nvPr/>
+        </p:nvCxnSpPr>
+        <p:spPr>
+          <a:xfrm flipV="1">
+            <a:off x="940726" y="842041"/>
+            <a:ext cx="617551" cy="1127461"/>
+          </a:xfrm>
+          <a:prstGeom prst="line">
+            <a:avLst/>
+          </a:prstGeom>
+          <a:ln w="6350">
+            <a:solidFill>
+              <a:schemeClr val="tx1"/>
+            </a:solidFill>
+            <a:headEnd type="oval"/>
+            <a:tailEnd type="oval"/>
+          </a:ln>
+        </p:spPr>
+        <p:style>
+          <a:lnRef idx="1">
+            <a:schemeClr val="accent1"/>
+          </a:lnRef>
+          <a:fillRef idx="0">
+            <a:schemeClr val="accent1"/>
+          </a:fillRef>
+          <a:effectRef idx="0">
+            <a:schemeClr val="accent1"/>
+          </a:effectRef>
+          <a:fontRef idx="minor">
+            <a:schemeClr val="tx1"/>
+          </a:fontRef>
+        </p:style>
+      </p:cxnSp>
+      <p:cxnSp>
+        <p:nvCxnSpPr>
+          <p:cNvPr id="28" name="Connecteur droit 27">
+            <a:extLst>
+              <a:ext uri="{FF2B5EF4-FFF2-40B4-BE49-F238E27FC236}">
+                <a16:creationId xmlns:a16="http://schemas.microsoft.com/office/drawing/2014/main" id="{E015D396-DB2B-493E-8246-97B883EF32C7}"/>
+              </a:ext>
+            </a:extLst>
+          </p:cNvPr>
+          <p:cNvCxnSpPr>
+            <a:cxnSpLocks/>
+          </p:cNvCxnSpPr>
+          <p:nvPr/>
+        </p:nvCxnSpPr>
+        <p:spPr>
+          <a:xfrm flipH="1" flipV="1">
+            <a:off x="1555293" y="842041"/>
+            <a:ext cx="617551" cy="1127461"/>
+          </a:xfrm>
+          <a:prstGeom prst="line">
+            <a:avLst/>
+          </a:prstGeom>
+          <a:ln>
+            <a:solidFill>
+              <a:schemeClr val="tx1"/>
+            </a:solidFill>
+            <a:headEnd type="oval" w="lg" len="lg"/>
+            <a:tailEnd type="oval" w="lg" len="lg"/>
+          </a:ln>
+        </p:spPr>
+        <p:style>
+          <a:lnRef idx="1">
+            <a:schemeClr val="accent1"/>
+          </a:lnRef>
+          <a:fillRef idx="0">
+            <a:schemeClr val="accent1"/>
+          </a:fillRef>
+          <a:effectRef idx="0">
+            <a:schemeClr val="accent1"/>
+          </a:effectRef>
+          <a:fontRef idx="minor">
+            <a:schemeClr val="tx1"/>
+          </a:fontRef>
+        </p:style>
+      </p:cxnSp>
+      <p:cxnSp>
+        <p:nvCxnSpPr>
+          <p:cNvPr id="29" name="Connecteur droit 28">
+            <a:extLst>
+              <a:ext uri="{FF2B5EF4-FFF2-40B4-BE49-F238E27FC236}">
+                <a16:creationId xmlns:a16="http://schemas.microsoft.com/office/drawing/2014/main" id="{E9F5A0C4-F3EE-42CB-B8B3-0E047BA21819}"/>
+              </a:ext>
+            </a:extLst>
+          </p:cNvPr>
+          <p:cNvCxnSpPr>
+            <a:cxnSpLocks/>
+          </p:cNvCxnSpPr>
+          <p:nvPr/>
+        </p:nvCxnSpPr>
+        <p:spPr>
+          <a:xfrm>
+            <a:off x="1556416" y="842042"/>
+            <a:ext cx="0" cy="1"/>
+          </a:xfrm>
+          <a:prstGeom prst="line">
+            <a:avLst/>
+          </a:prstGeom>
+          <a:ln w="28575">
+            <a:solidFill>
+              <a:srgbClr val="C00000"/>
+            </a:solidFill>
+            <a:headEnd type="oval" w="lg" len="lg"/>
+            <a:tailEnd type="oval"/>
+          </a:ln>
+        </p:spPr>
+        <p:style>
+          <a:lnRef idx="1">
+            <a:schemeClr val="accent1"/>
+          </a:lnRef>
+          <a:fillRef idx="0">
+            <a:schemeClr val="accent1"/>
+          </a:fillRef>
+          <a:effectRef idx="0">
+            <a:schemeClr val="accent1"/>
+          </a:effectRef>
+          <a:fontRef idx="minor">
+            <a:schemeClr val="tx1"/>
+          </a:fontRef>
+        </p:style>
+      </p:cxnSp>
+      <p:cxnSp>
+        <p:nvCxnSpPr>
+          <p:cNvPr id="33" name="Connecteur droit 32">
+            <a:extLst>
+              <a:ext uri="{FF2B5EF4-FFF2-40B4-BE49-F238E27FC236}">
+                <a16:creationId xmlns:a16="http://schemas.microsoft.com/office/drawing/2014/main" id="{457305BB-E77D-458B-B82F-AE36D3855DA7}"/>
+              </a:ext>
+            </a:extLst>
+          </p:cNvPr>
+          <p:cNvCxnSpPr>
+            <a:cxnSpLocks/>
+          </p:cNvCxnSpPr>
+          <p:nvPr/>
+        </p:nvCxnSpPr>
+        <p:spPr>
+          <a:xfrm>
+            <a:off x="3833513" y="3352546"/>
+            <a:ext cx="0" cy="0"/>
+          </a:xfrm>
+          <a:prstGeom prst="line">
+            <a:avLst/>
+          </a:prstGeom>
+          <a:ln w="28575">
+            <a:solidFill>
+              <a:srgbClr val="C00000"/>
+            </a:solidFill>
+            <a:headEnd type="oval" w="lg" len="lg"/>
+            <a:tailEnd type="oval"/>
+          </a:ln>
+        </p:spPr>
+        <p:style>
+          <a:lnRef idx="1">
+            <a:schemeClr val="accent1"/>
+          </a:lnRef>
+          <a:fillRef idx="0">
+            <a:schemeClr val="accent1"/>
+          </a:fillRef>
+          <a:effectRef idx="0">
+            <a:schemeClr val="accent1"/>
+          </a:effectRef>
+          <a:fontRef idx="minor">
+            <a:schemeClr val="tx1"/>
+          </a:fontRef>
+        </p:style>
+      </p:cxnSp>
+      <mc:AlternateContent xmlns:mc="http://schemas.openxmlformats.org/markup-compatibility/2006">
+        <mc:Choice xmlns:a14="http://schemas.microsoft.com/office/drawing/2010/main" Requires="a14">
+          <p:sp>
+            <p:nvSpPr>
+              <p:cNvPr id="42" name="ZoneTexte 41">
+                <a:extLst>
+                  <a:ext uri="{FF2B5EF4-FFF2-40B4-BE49-F238E27FC236}">
+                    <a16:creationId xmlns:a16="http://schemas.microsoft.com/office/drawing/2014/main" id="{09444BD3-FF3B-4A39-8578-1A517544DF9C}"/>
+                  </a:ext>
+                </a:extLst>
+              </p:cNvPr>
+              <p:cNvSpPr txBox="1"/>
+              <p:nvPr/>
+            </p:nvSpPr>
+            <p:spPr>
+              <a:xfrm>
+                <a:off x="2384685" y="842032"/>
+                <a:ext cx="990079" cy="430887"/>
+              </a:xfrm>
+              <a:prstGeom prst="rect">
+                <a:avLst/>
+              </a:prstGeom>
+              <a:noFill/>
+              <a:ln>
+                <a:noFill/>
+              </a:ln>
+            </p:spPr>
+            <p:txBody>
+              <a:bodyPr wrap="none" lIns="0" tIns="0" rIns="0" bIns="0" rtlCol="0">
+                <a:spAutoFit/>
+              </a:bodyPr>
+              <a:lstStyle/>
+              <a:p>
+                <a:pPr/>
+                <a14:m>
+                  <m:oMathPara xmlns:m="http://schemas.openxmlformats.org/officeDocument/2006/math">
+                    <m:oMathParaPr>
+                      <m:jc m:val="centerGroup"/>
+                    </m:oMathParaPr>
+                    <m:oMath xmlns:m="http://schemas.openxmlformats.org/officeDocument/2006/math">
+                      <m:r>
+                        <a:rPr lang="fr-FR" sz="2800" b="0" i="1" smtClean="0">
+                          <a:latin typeface="Cambria Math" panose="02040503050406030204" pitchFamily="18" charset="0"/>
+                        </a:rPr>
+                        <m:t>𝑇</m:t>
+                      </m:r>
+                      <m:r>
+                        <a:rPr lang="fr-FR" sz="2800" b="0" i="1" smtClean="0">
+                          <a:latin typeface="Cambria Math" panose="02040503050406030204" pitchFamily="18" charset="0"/>
+                        </a:rPr>
+                        <m:t>(</m:t>
+                      </m:r>
+                      <m:sSub>
+                        <m:sSubPr>
+                          <m:ctrlPr>
+                            <a:rPr lang="fr-FR" sz="2800" b="0" i="1" smtClean="0">
+                              <a:latin typeface="Cambria Math" panose="02040503050406030204" pitchFamily="18" charset="0"/>
+                            </a:rPr>
+                          </m:ctrlPr>
+                        </m:sSubPr>
+                        <m:e>
+                          <m:r>
+                            <a:rPr lang="fr-FR" sz="2800" b="0" i="1" smtClean="0">
+                              <a:latin typeface="Cambria Math" panose="02040503050406030204" pitchFamily="18" charset="0"/>
+                            </a:rPr>
+                            <m:t>𝒢</m:t>
+                          </m:r>
+                        </m:e>
+                        <m:sub>
+                          <m:r>
+                            <a:rPr lang="fr-FR" sz="2800" b="0" i="1" smtClean="0">
+                              <a:latin typeface="Cambria Math" panose="02040503050406030204" pitchFamily="18" charset="0"/>
+                            </a:rPr>
+                            <m:t>𝑛</m:t>
+                          </m:r>
+                        </m:sub>
+                      </m:sSub>
+                      <m:r>
+                        <a:rPr lang="fr-FR" sz="2800" b="0" i="1" smtClean="0">
+                          <a:latin typeface="Cambria Math" panose="02040503050406030204" pitchFamily="18" charset="0"/>
+                        </a:rPr>
+                        <m:t>)</m:t>
+                      </m:r>
+                    </m:oMath>
+                  </m:oMathPara>
+                </a14:m>
+                <a:endParaRPr lang="fr-FR" sz="2800" dirty="0"/>
+              </a:p>
+            </p:txBody>
+          </p:sp>
+        </mc:Choice>
+        <mc:Fallback>
+          <p:sp>
+            <p:nvSpPr>
+              <p:cNvPr id="42" name="ZoneTexte 41">
+                <a:extLst>
+                  <a:ext uri="{FF2B5EF4-FFF2-40B4-BE49-F238E27FC236}">
+                    <a16:creationId xmlns:a16="http://schemas.microsoft.com/office/drawing/2014/main" id="{09444BD3-FF3B-4A39-8578-1A517544DF9C}"/>
+                  </a:ext>
+                </a:extLst>
+              </p:cNvPr>
+              <p:cNvSpPr txBox="1">
+                <a:spLocks noRot="1" noChangeAspect="1" noMove="1" noResize="1" noEditPoints="1" noAdjustHandles="1" noChangeArrowheads="1" noChangeShapeType="1" noTextEdit="1"/>
+              </p:cNvSpPr>
+              <p:nvPr/>
+            </p:nvSpPr>
+            <p:spPr>
+              <a:xfrm>
+                <a:off x="2384685" y="842032"/>
+                <a:ext cx="990079" cy="430887"/>
+              </a:xfrm>
+              <a:prstGeom prst="rect">
+                <a:avLst/>
+              </a:prstGeom>
+              <a:blipFill>
+                <a:blip r:embed="rId2"/>
+                <a:stretch>
+                  <a:fillRect/>
+                </a:stretch>
+              </a:blipFill>
+              <a:ln>
+                <a:noFill/>
+              </a:ln>
+            </p:spPr>
+            <p:txBody>
+              <a:bodyPr/>
+              <a:lstStyle/>
+              <a:p>
+                <a:r>
+                  <a:rPr lang="fr-FR">
+                    <a:noFill/>
+                  </a:rPr>
+                  <a:t> </a:t>
+                </a:r>
+              </a:p>
+            </p:txBody>
+          </p:sp>
+        </mc:Fallback>
+      </mc:AlternateContent>
+      <p:cxnSp>
+        <p:nvCxnSpPr>
+          <p:cNvPr id="43" name="Connecteur droit 42">
+            <a:extLst>
+              <a:ext uri="{FF2B5EF4-FFF2-40B4-BE49-F238E27FC236}">
+                <a16:creationId xmlns:a16="http://schemas.microsoft.com/office/drawing/2014/main" id="{B4A950EF-C211-4A15-B874-76E682760B28}"/>
+              </a:ext>
+            </a:extLst>
+          </p:cNvPr>
+          <p:cNvCxnSpPr>
+            <a:cxnSpLocks/>
+          </p:cNvCxnSpPr>
+          <p:nvPr/>
+        </p:nvCxnSpPr>
+        <p:spPr>
+          <a:xfrm>
+            <a:off x="940726" y="1969502"/>
+            <a:ext cx="1" cy="1"/>
+          </a:xfrm>
+          <a:prstGeom prst="line">
+            <a:avLst/>
+          </a:prstGeom>
+          <a:ln w="28575">
+            <a:solidFill>
+              <a:srgbClr val="0070C0"/>
+            </a:solidFill>
+            <a:headEnd type="oval" w="lg" len="lg"/>
+            <a:tailEnd type="oval"/>
+          </a:ln>
+        </p:spPr>
+        <p:style>
+          <a:lnRef idx="1">
+            <a:schemeClr val="accent1"/>
+          </a:lnRef>
+          <a:fillRef idx="0">
+            <a:schemeClr val="accent1"/>
+          </a:fillRef>
+          <a:effectRef idx="0">
+            <a:schemeClr val="accent1"/>
+          </a:effectRef>
+          <a:fontRef idx="minor">
+            <a:schemeClr val="tx1"/>
+          </a:fontRef>
+        </p:style>
+      </p:cxnSp>
+      <p:cxnSp>
+        <p:nvCxnSpPr>
+          <p:cNvPr id="46" name="Connecteur droit 45">
+            <a:extLst>
+              <a:ext uri="{FF2B5EF4-FFF2-40B4-BE49-F238E27FC236}">
+                <a16:creationId xmlns:a16="http://schemas.microsoft.com/office/drawing/2014/main" id="{2018235F-C80D-45F0-8B39-D83FAADFD9BB}"/>
+              </a:ext>
+            </a:extLst>
+          </p:cNvPr>
+          <p:cNvCxnSpPr>
+            <a:cxnSpLocks/>
+          </p:cNvCxnSpPr>
+          <p:nvPr/>
+        </p:nvCxnSpPr>
+        <p:spPr>
+          <a:xfrm flipH="1">
+            <a:off x="4719587" y="1969492"/>
+            <a:ext cx="1" cy="0"/>
+          </a:xfrm>
+          <a:prstGeom prst="line">
+            <a:avLst/>
+          </a:prstGeom>
+          <a:ln w="28575">
+            <a:solidFill>
+              <a:srgbClr val="0070C0"/>
+            </a:solidFill>
+            <a:headEnd type="oval" w="lg" len="lg"/>
+            <a:tailEnd type="oval"/>
+          </a:ln>
+        </p:spPr>
+        <p:style>
+          <a:lnRef idx="1">
+            <a:schemeClr val="accent1"/>
+          </a:lnRef>
+          <a:fillRef idx="0">
+            <a:schemeClr val="accent1"/>
+          </a:fillRef>
+          <a:effectRef idx="0">
+            <a:schemeClr val="accent1"/>
+          </a:effectRef>
+          <a:fontRef idx="minor">
+            <a:schemeClr val="tx1"/>
+          </a:fontRef>
+        </p:style>
+      </p:cxnSp>
+      <p:cxnSp>
+        <p:nvCxnSpPr>
+          <p:cNvPr id="18" name="Connecteur droit 17">
+            <a:extLst>
+              <a:ext uri="{FF2B5EF4-FFF2-40B4-BE49-F238E27FC236}">
+                <a16:creationId xmlns:a16="http://schemas.microsoft.com/office/drawing/2014/main" id="{AA6A8A39-EAB8-4B2B-AA60-B3FAF3300A6B}"/>
+              </a:ext>
+            </a:extLst>
+          </p:cNvPr>
+          <p:cNvCxnSpPr>
+            <a:cxnSpLocks/>
+          </p:cNvCxnSpPr>
+          <p:nvPr/>
+        </p:nvCxnSpPr>
+        <p:spPr>
+          <a:xfrm flipV="1">
+            <a:off x="3658220" y="3352522"/>
+            <a:ext cx="178277" cy="1229003"/>
+          </a:xfrm>
+          <a:prstGeom prst="line">
+            <a:avLst/>
+          </a:prstGeom>
+          <a:ln w="6350">
+            <a:solidFill>
+              <a:schemeClr val="tx1"/>
+            </a:solidFill>
+            <a:headEnd type="oval"/>
+            <a:tailEnd type="oval"/>
+          </a:ln>
+        </p:spPr>
+        <p:style>
+          <a:lnRef idx="1">
+            <a:schemeClr val="accent1"/>
+          </a:lnRef>
+          <a:fillRef idx="0">
+            <a:schemeClr val="accent1"/>
+          </a:fillRef>
+          <a:effectRef idx="0">
+            <a:schemeClr val="accent1"/>
+          </a:effectRef>
+          <a:fontRef idx="minor">
+            <a:schemeClr val="tx1"/>
+          </a:fontRef>
+        </p:style>
+      </p:cxnSp>
+      <p:cxnSp>
+        <p:nvCxnSpPr>
+          <p:cNvPr id="19" name="Connecteur droit 18">
+            <a:extLst>
+              <a:ext uri="{FF2B5EF4-FFF2-40B4-BE49-F238E27FC236}">
+                <a16:creationId xmlns:a16="http://schemas.microsoft.com/office/drawing/2014/main" id="{8F085D3F-55E1-4B3D-BD40-C18F6D4E80CE}"/>
+              </a:ext>
+            </a:extLst>
+          </p:cNvPr>
+          <p:cNvCxnSpPr>
+            <a:cxnSpLocks/>
+          </p:cNvCxnSpPr>
+          <p:nvPr/>
+        </p:nvCxnSpPr>
+        <p:spPr>
+          <a:xfrm flipH="1" flipV="1">
+            <a:off x="3833515" y="3352524"/>
+            <a:ext cx="170459" cy="1229001"/>
+          </a:xfrm>
+          <a:prstGeom prst="line">
+            <a:avLst/>
+          </a:prstGeom>
+          <a:ln>
+            <a:solidFill>
+              <a:schemeClr val="tx1"/>
+            </a:solidFill>
+            <a:headEnd type="oval" w="lg" len="lg"/>
+            <a:tailEnd type="oval" w="lg" len="lg"/>
+          </a:ln>
+        </p:spPr>
+        <p:style>
+          <a:lnRef idx="1">
+            <a:schemeClr val="accent1"/>
+          </a:lnRef>
+          <a:fillRef idx="0">
+            <a:schemeClr val="accent1"/>
+          </a:fillRef>
+          <a:effectRef idx="0">
+            <a:schemeClr val="accent1"/>
+          </a:effectRef>
+          <a:fontRef idx="minor">
+            <a:schemeClr val="tx1"/>
+          </a:fontRef>
+        </p:style>
+      </p:cxnSp>
+      <p:cxnSp>
+        <p:nvCxnSpPr>
+          <p:cNvPr id="21" name="Connecteur droit 20">
+            <a:extLst>
+              <a:ext uri="{FF2B5EF4-FFF2-40B4-BE49-F238E27FC236}">
+                <a16:creationId xmlns:a16="http://schemas.microsoft.com/office/drawing/2014/main" id="{19B74D00-BE15-402D-9538-9468DD61FBDB}"/>
+              </a:ext>
+            </a:extLst>
+          </p:cNvPr>
+          <p:cNvCxnSpPr>
+            <a:cxnSpLocks/>
+          </p:cNvCxnSpPr>
+          <p:nvPr/>
+        </p:nvCxnSpPr>
+        <p:spPr>
+          <a:xfrm>
+            <a:off x="3834636" y="3352522"/>
+            <a:ext cx="0" cy="1"/>
+          </a:xfrm>
+          <a:prstGeom prst="line">
+            <a:avLst/>
+          </a:prstGeom>
+          <a:ln w="28575">
+            <a:solidFill>
+              <a:srgbClr val="C00000"/>
+            </a:solidFill>
+            <a:headEnd type="oval" w="lg" len="lg"/>
+            <a:tailEnd type="oval"/>
+          </a:ln>
+        </p:spPr>
+        <p:style>
+          <a:lnRef idx="1">
+            <a:schemeClr val="accent1"/>
+          </a:lnRef>
+          <a:fillRef idx="0">
+            <a:schemeClr val="accent1"/>
+          </a:fillRef>
+          <a:effectRef idx="0">
+            <a:schemeClr val="accent1"/>
+          </a:effectRef>
+          <a:fontRef idx="minor">
+            <a:schemeClr val="tx1"/>
+          </a:fontRef>
+        </p:style>
+      </p:cxnSp>
+      <p:cxnSp>
+        <p:nvCxnSpPr>
+          <p:cNvPr id="22" name="Connecteur droit 21">
+            <a:extLst>
+              <a:ext uri="{FF2B5EF4-FFF2-40B4-BE49-F238E27FC236}">
+                <a16:creationId xmlns:a16="http://schemas.microsoft.com/office/drawing/2014/main" id="{F71D45AF-A4A1-4CD8-B847-EED40CE0B35D}"/>
+              </a:ext>
+            </a:extLst>
+          </p:cNvPr>
+          <p:cNvCxnSpPr>
+            <a:cxnSpLocks/>
+          </p:cNvCxnSpPr>
+          <p:nvPr/>
+        </p:nvCxnSpPr>
+        <p:spPr>
+          <a:xfrm flipV="1">
+            <a:off x="3659710" y="4581525"/>
+            <a:ext cx="0" cy="1"/>
+          </a:xfrm>
+          <a:prstGeom prst="line">
+            <a:avLst/>
+          </a:prstGeom>
+          <a:ln w="28575">
+            <a:solidFill>
+              <a:srgbClr val="0070C0"/>
+            </a:solidFill>
+            <a:headEnd type="oval" w="lg" len="lg"/>
+            <a:tailEnd type="oval"/>
+          </a:ln>
+        </p:spPr>
+        <p:style>
+          <a:lnRef idx="1">
+            <a:schemeClr val="accent1"/>
+          </a:lnRef>
+          <a:fillRef idx="0">
+            <a:schemeClr val="accent1"/>
+          </a:fillRef>
+          <a:effectRef idx="0">
+            <a:schemeClr val="accent1"/>
+          </a:effectRef>
+          <a:fontRef idx="minor">
+            <a:schemeClr val="tx1"/>
+          </a:fontRef>
+        </p:style>
+      </p:cxnSp>
+    </p:spTree>
+    <p:extLst>
+      <p:ext uri="{BB962C8B-B14F-4D97-AF65-F5344CB8AC3E}">
+        <p14:creationId xmlns:p14="http://schemas.microsoft.com/office/powerpoint/2010/main" val="3031403019"/>
       </p:ext>
     </p:extLst>
   </p:cSld>

</xml_diff>